<commit_message>
Project Report and Presentation
</commit_message>
<xml_diff>
--- a/Project Progress Presentaion.pptx
+++ b/Project Progress Presentaion.pptx
@@ -12,10 +12,10 @@
     <p:sldId id="258" r:id="rId3"/>
     <p:sldId id="259" r:id="rId4"/>
     <p:sldId id="260" r:id="rId5"/>
-    <p:sldId id="262" r:id="rId6"/>
+    <p:sldId id="273" r:id="rId6"/>
     <p:sldId id="264" r:id="rId7"/>
     <p:sldId id="265" r:id="rId8"/>
-    <p:sldId id="268" r:id="rId9"/>
+    <p:sldId id="274" r:id="rId9"/>
     <p:sldId id="266" r:id="rId10"/>
     <p:sldId id="267" r:id="rId11"/>
     <p:sldId id="271" r:id="rId12"/>
@@ -2046,6 +2046,13 @@
         </dgm:presLayoutVars>
       </dgm:prSet>
       <dgm:spPr/>
+      <dgm:t>
+        <a:bodyPr/>
+        <a:lstStyle/>
+        <a:p>
+          <a:endParaRPr lang="en-US"/>
+        </a:p>
+      </dgm:t>
     </dgm:pt>
     <dgm:pt modelId="{734875A9-DF35-4D71-BCAF-AB0B128F1338}" type="pres">
       <dgm:prSet presAssocID="{F441001E-6347-43AB-ACFD-650031A5166E}" presName="parentText" presStyleLbl="node1" presStyleIdx="0" presStyleCnt="5" custLinFactNeighborX="3" custLinFactNeighborY="-13773">
@@ -2055,6 +2062,13 @@
         </dgm:presLayoutVars>
       </dgm:prSet>
       <dgm:spPr/>
+      <dgm:t>
+        <a:bodyPr/>
+        <a:lstStyle/>
+        <a:p>
+          <a:endParaRPr lang="en-US"/>
+        </a:p>
+      </dgm:t>
     </dgm:pt>
     <dgm:pt modelId="{4656F6B9-0B5C-4A8C-8068-E41621E2757F}" type="pres">
       <dgm:prSet presAssocID="{F441001E-6347-43AB-ACFD-650031A5166E}" presName="childText" presStyleLbl="revTx" presStyleIdx="0" presStyleCnt="5">
@@ -2063,6 +2077,13 @@
         </dgm:presLayoutVars>
       </dgm:prSet>
       <dgm:spPr/>
+      <dgm:t>
+        <a:bodyPr/>
+        <a:lstStyle/>
+        <a:p>
+          <a:endParaRPr lang="en-US"/>
+        </a:p>
+      </dgm:t>
     </dgm:pt>
     <dgm:pt modelId="{B6AF7AD7-3201-4241-BDA7-8D8F37824F30}" type="pres">
       <dgm:prSet presAssocID="{A1BF7326-E5BD-408F-8482-FEB1A58EFE63}" presName="parentText" presStyleLbl="node1" presStyleIdx="1" presStyleCnt="5" custLinFactNeighborX="0" custLinFactNeighborY="-8765">
@@ -2072,6 +2093,13 @@
         </dgm:presLayoutVars>
       </dgm:prSet>
       <dgm:spPr/>
+      <dgm:t>
+        <a:bodyPr/>
+        <a:lstStyle/>
+        <a:p>
+          <a:endParaRPr lang="en-US"/>
+        </a:p>
+      </dgm:t>
     </dgm:pt>
     <dgm:pt modelId="{D6EC59F5-0F4B-46C9-A10F-274F2A83C0F7}" type="pres">
       <dgm:prSet presAssocID="{A1BF7326-E5BD-408F-8482-FEB1A58EFE63}" presName="childText" presStyleLbl="revTx" presStyleIdx="1" presStyleCnt="5">
@@ -2080,6 +2108,13 @@
         </dgm:presLayoutVars>
       </dgm:prSet>
       <dgm:spPr/>
+      <dgm:t>
+        <a:bodyPr/>
+        <a:lstStyle/>
+        <a:p>
+          <a:endParaRPr lang="en-US"/>
+        </a:p>
+      </dgm:t>
     </dgm:pt>
     <dgm:pt modelId="{89E08625-7F36-4A1F-8391-7D72A0885382}" type="pres">
       <dgm:prSet presAssocID="{FCC5EB99-0189-455A-919F-64281EE814A9}" presName="parentText" presStyleLbl="node1" presStyleIdx="2" presStyleCnt="5">
@@ -2089,6 +2124,13 @@
         </dgm:presLayoutVars>
       </dgm:prSet>
       <dgm:spPr/>
+      <dgm:t>
+        <a:bodyPr/>
+        <a:lstStyle/>
+        <a:p>
+          <a:endParaRPr lang="en-US"/>
+        </a:p>
+      </dgm:t>
     </dgm:pt>
     <dgm:pt modelId="{364220FD-3EF2-422A-A322-24ECEF43A84F}" type="pres">
       <dgm:prSet presAssocID="{FCC5EB99-0189-455A-919F-64281EE814A9}" presName="childText" presStyleLbl="revTx" presStyleIdx="2" presStyleCnt="5">
@@ -2097,6 +2139,13 @@
         </dgm:presLayoutVars>
       </dgm:prSet>
       <dgm:spPr/>
+      <dgm:t>
+        <a:bodyPr/>
+        <a:lstStyle/>
+        <a:p>
+          <a:endParaRPr lang="en-US"/>
+        </a:p>
+      </dgm:t>
     </dgm:pt>
     <dgm:pt modelId="{16B7D458-1B62-466B-B995-BFD685185481}" type="pres">
       <dgm:prSet presAssocID="{0CC4204E-4E00-4F80-995D-90AB35516B41}" presName="parentText" presStyleLbl="node1" presStyleIdx="3" presStyleCnt="5">
@@ -2106,6 +2155,13 @@
         </dgm:presLayoutVars>
       </dgm:prSet>
       <dgm:spPr/>
+      <dgm:t>
+        <a:bodyPr/>
+        <a:lstStyle/>
+        <a:p>
+          <a:endParaRPr lang="en-US"/>
+        </a:p>
+      </dgm:t>
     </dgm:pt>
     <dgm:pt modelId="{C4521C3D-B2A1-4494-B726-FC4A19209F83}" type="pres">
       <dgm:prSet presAssocID="{0CC4204E-4E00-4F80-995D-90AB35516B41}" presName="childText" presStyleLbl="revTx" presStyleIdx="3" presStyleCnt="5">
@@ -2114,6 +2170,13 @@
         </dgm:presLayoutVars>
       </dgm:prSet>
       <dgm:spPr/>
+      <dgm:t>
+        <a:bodyPr/>
+        <a:lstStyle/>
+        <a:p>
+          <a:endParaRPr lang="en-US"/>
+        </a:p>
+      </dgm:t>
     </dgm:pt>
     <dgm:pt modelId="{43CAB317-6D3E-4B76-9DF6-07B4AFBFE786}" type="pres">
       <dgm:prSet presAssocID="{B27C3A9F-9554-47AE-98C9-07C67B84D136}" presName="parentText" presStyleLbl="node1" presStyleIdx="4" presStyleCnt="5">
@@ -2123,6 +2186,13 @@
         </dgm:presLayoutVars>
       </dgm:prSet>
       <dgm:spPr/>
+      <dgm:t>
+        <a:bodyPr/>
+        <a:lstStyle/>
+        <a:p>
+          <a:endParaRPr lang="en-US"/>
+        </a:p>
+      </dgm:t>
     </dgm:pt>
     <dgm:pt modelId="{B0240379-8454-4965-AB02-BE8DFBA46394}" type="pres">
       <dgm:prSet presAssocID="{B27C3A9F-9554-47AE-98C9-07C67B84D136}" presName="childText" presStyleLbl="revTx" presStyleIdx="4" presStyleCnt="5">
@@ -2131,30 +2201,37 @@
         </dgm:presLayoutVars>
       </dgm:prSet>
       <dgm:spPr/>
+      <dgm:t>
+        <a:bodyPr/>
+        <a:lstStyle/>
+        <a:p>
+          <a:endParaRPr lang="en-US"/>
+        </a:p>
+      </dgm:t>
     </dgm:pt>
   </dgm:ptLst>
   <dgm:cxnLst>
+    <dgm:cxn modelId="{5AA24149-10ED-4E9F-9D3C-F9C97ADF90D7}" type="presOf" srcId="{E8F56E97-412C-4172-AD8E-2F0E80656ED4}" destId="{C4521C3D-B2A1-4494-B726-FC4A19209F83}" srcOrd="0" destOrd="0" presId="urn:microsoft.com/office/officeart/2005/8/layout/vList2"/>
+    <dgm:cxn modelId="{DDA54052-C3A0-4BCA-9F70-2AF94A0D99D9}" type="presOf" srcId="{FCC5EB99-0189-455A-919F-64281EE814A9}" destId="{89E08625-7F36-4A1F-8391-7D72A0885382}" srcOrd="0" destOrd="0" presId="urn:microsoft.com/office/officeart/2005/8/layout/vList2"/>
+    <dgm:cxn modelId="{1BC2E42B-898A-4F5C-8DD5-107F0BAA7FF8}" type="presOf" srcId="{A1BF7326-E5BD-408F-8482-FEB1A58EFE63}" destId="{B6AF7AD7-3201-4241-BDA7-8D8F37824F30}" srcOrd="0" destOrd="0" presId="urn:microsoft.com/office/officeart/2005/8/layout/vList2"/>
+    <dgm:cxn modelId="{0AA675D1-0E99-402B-9118-A5AE46E6DC44}" srcId="{7E2D2691-3D14-43E6-A9E5-BC35CA444289}" destId="{FCC5EB99-0189-455A-919F-64281EE814A9}" srcOrd="2" destOrd="0" parTransId="{6E87FE38-6CBC-4750-A421-7E24FA7BCAA7}" sibTransId="{FA512BC8-B086-43CD-B45D-BC1E48BF854A}"/>
+    <dgm:cxn modelId="{207A5791-2587-41DE-90AF-55660FB289AD}" type="presOf" srcId="{B27C3A9F-9554-47AE-98C9-07C67B84D136}" destId="{43CAB317-6D3E-4B76-9DF6-07B4AFBFE786}" srcOrd="0" destOrd="0" presId="urn:microsoft.com/office/officeart/2005/8/layout/vList2"/>
+    <dgm:cxn modelId="{2C41B037-D81C-4062-A03D-B8557585D702}" srcId="{7E2D2691-3D14-43E6-A9E5-BC35CA444289}" destId="{A1BF7326-E5BD-408F-8482-FEB1A58EFE63}" srcOrd="1" destOrd="0" parTransId="{1570DF23-8435-4C8E-9C47-2C1D5280E57E}" sibTransId="{745C0054-9109-432E-912C-8BA46F5D1555}"/>
+    <dgm:cxn modelId="{AEC5C7B9-C968-4F78-81B6-FA00F2826EA8}" type="presOf" srcId="{9DB47A99-8901-4143-9EFE-5688CF9DEBE0}" destId="{364220FD-3EF2-422A-A322-24ECEF43A84F}" srcOrd="0" destOrd="0" presId="urn:microsoft.com/office/officeart/2005/8/layout/vList2"/>
     <dgm:cxn modelId="{9C22230A-0B82-465F-AEE4-A6C34F5E92A2}" type="presOf" srcId="{0CC4204E-4E00-4F80-995D-90AB35516B41}" destId="{16B7D458-1B62-466B-B995-BFD685185481}" srcOrd="0" destOrd="0" presId="urn:microsoft.com/office/officeart/2005/8/layout/vList2"/>
-    <dgm:cxn modelId="{1BC2E42B-898A-4F5C-8DD5-107F0BAA7FF8}" type="presOf" srcId="{A1BF7326-E5BD-408F-8482-FEB1A58EFE63}" destId="{B6AF7AD7-3201-4241-BDA7-8D8F37824F30}" srcOrd="0" destOrd="0" presId="urn:microsoft.com/office/officeart/2005/8/layout/vList2"/>
-    <dgm:cxn modelId="{C5DD8E2E-F430-4337-8F07-8798D114E6CC}" type="presOf" srcId="{B04D8804-C673-4D58-AC97-87128E74436D}" destId="{4656F6B9-0B5C-4A8C-8068-E41621E2757F}" srcOrd="0" destOrd="0" presId="urn:microsoft.com/office/officeart/2005/8/layout/vList2"/>
-    <dgm:cxn modelId="{2C41B037-D81C-4062-A03D-B8557585D702}" srcId="{7E2D2691-3D14-43E6-A9E5-BC35CA444289}" destId="{A1BF7326-E5BD-408F-8482-FEB1A58EFE63}" srcOrd="1" destOrd="0" parTransId="{1570DF23-8435-4C8E-9C47-2C1D5280E57E}" sibTransId="{745C0054-9109-432E-912C-8BA46F5D1555}"/>
+    <dgm:cxn modelId="{D93B20BD-BBFF-46E5-B2C8-F668C2D1426B}" srcId="{B27C3A9F-9554-47AE-98C9-07C67B84D136}" destId="{D491DCF7-538A-4B90-92D1-426BA86D1D17}" srcOrd="0" destOrd="0" parTransId="{2082CA8E-ADF5-462A-A1B7-DF851BA421A7}" sibTransId="{7C2E1EDD-93B5-4108-8ECC-B4FEBF7F4B46}"/>
+    <dgm:cxn modelId="{B072A1EE-11EF-408B-B0FF-52491FA2895F}" srcId="{7E2D2691-3D14-43E6-A9E5-BC35CA444289}" destId="{B27C3A9F-9554-47AE-98C9-07C67B84D136}" srcOrd="4" destOrd="0" parTransId="{CE41282A-FDFE-4415-A517-6543734A3B52}" sibTransId="{AA938921-ADD6-4017-8229-1A7734A2CC4F}"/>
+    <dgm:cxn modelId="{A6DEA6C7-F274-42DC-9808-E794B349EC74}" type="presOf" srcId="{61225D35-1412-4845-B52E-AFD17D919B42}" destId="{D6EC59F5-0F4B-46C9-A10F-274F2A83C0F7}" srcOrd="0" destOrd="0" presId="urn:microsoft.com/office/officeart/2005/8/layout/vList2"/>
+    <dgm:cxn modelId="{8BD83AAB-3124-4F59-9148-540A2086CAB0}" srcId="{7E2D2691-3D14-43E6-A9E5-BC35CA444289}" destId="{0CC4204E-4E00-4F80-995D-90AB35516B41}" srcOrd="3" destOrd="0" parTransId="{1783D2AA-78D8-48B2-85F3-F3FD5F89F5A6}" sibTransId="{7365EEC1-146B-4853-B0CE-51A0D184F9DE}"/>
+    <dgm:cxn modelId="{748345C2-24A7-4E65-9F0B-F3B1EF4166B8}" srcId="{FCC5EB99-0189-455A-919F-64281EE814A9}" destId="{9DB47A99-8901-4143-9EFE-5688CF9DEBE0}" srcOrd="0" destOrd="0" parTransId="{52773EE8-BFD8-44C9-913C-FB11E9D3E1A0}" sibTransId="{3CB05F45-EC10-415D-A533-56C963484BFE}"/>
+    <dgm:cxn modelId="{38448A4A-E07F-4F73-8EA7-FB10D94F4A0A}" type="presOf" srcId="{F441001E-6347-43AB-ACFD-650031A5166E}" destId="{734875A9-DF35-4D71-BCAF-AB0B128F1338}" srcOrd="0" destOrd="0" presId="urn:microsoft.com/office/officeart/2005/8/layout/vList2"/>
+    <dgm:cxn modelId="{B0A8CD52-C694-4546-A707-6316E28B1073}" srcId="{0CC4204E-4E00-4F80-995D-90AB35516B41}" destId="{E8F56E97-412C-4172-AD8E-2F0E80656ED4}" srcOrd="0" destOrd="0" parTransId="{56C5B4C6-DF60-48AC-9923-7805C6E467DA}" sibTransId="{9B5A7948-72D6-4F6E-A9C6-C18FD16C3D46}"/>
     <dgm:cxn modelId="{8AD9573A-0E89-45DA-966A-F77F34486D5D}" type="presOf" srcId="{7E2D2691-3D14-43E6-A9E5-BC35CA444289}" destId="{99CD70DE-6DD2-4790-B082-E21E45F152DF}" srcOrd="0" destOrd="0" presId="urn:microsoft.com/office/officeart/2005/8/layout/vList2"/>
     <dgm:cxn modelId="{E1E0205B-C3A1-43F4-9CCA-6B46E5D3205D}" srcId="{7E2D2691-3D14-43E6-A9E5-BC35CA444289}" destId="{F441001E-6347-43AB-ACFD-650031A5166E}" srcOrd="0" destOrd="0" parTransId="{BB88FC40-CA33-4FCB-99F4-1B15F81D4E4D}" sibTransId="{FEC5D3AD-D5AC-4588-BAD7-7A8B5ABE885C}"/>
+    <dgm:cxn modelId="{50EBE8B7-253C-4EA9-885B-44451D9F335C}" srcId="{A1BF7326-E5BD-408F-8482-FEB1A58EFE63}" destId="{61225D35-1412-4845-B52E-AFD17D919B42}" srcOrd="0" destOrd="0" parTransId="{EA240431-4D0B-4B5C-B7F9-37EE175D155C}" sibTransId="{1D0E24DE-4F75-465E-9361-60FD3B10E0C9}"/>
+    <dgm:cxn modelId="{C5DD8E2E-F430-4337-8F07-8798D114E6CC}" type="presOf" srcId="{B04D8804-C673-4D58-AC97-87128E74436D}" destId="{4656F6B9-0B5C-4A8C-8068-E41621E2757F}" srcOrd="0" destOrd="0" presId="urn:microsoft.com/office/officeart/2005/8/layout/vList2"/>
+    <dgm:cxn modelId="{FE0D4B4E-BF13-4814-8090-6EC54296BF5E}" type="presOf" srcId="{D491DCF7-538A-4B90-92D1-426BA86D1D17}" destId="{B0240379-8454-4965-AB02-BE8DFBA46394}" srcOrd="0" destOrd="0" presId="urn:microsoft.com/office/officeart/2005/8/layout/vList2"/>
     <dgm:cxn modelId="{AB224B5D-638A-4610-B76B-7563C0EB4425}" srcId="{F441001E-6347-43AB-ACFD-650031A5166E}" destId="{B04D8804-C673-4D58-AC97-87128E74436D}" srcOrd="0" destOrd="0" parTransId="{CBA0C92B-DC3C-41DB-BF4B-C053D005493C}" sibTransId="{CAD975A7-4278-4180-A594-3AF0C336E0EE}"/>
-    <dgm:cxn modelId="{5AA24149-10ED-4E9F-9D3C-F9C97ADF90D7}" type="presOf" srcId="{E8F56E97-412C-4172-AD8E-2F0E80656ED4}" destId="{C4521C3D-B2A1-4494-B726-FC4A19209F83}" srcOrd="0" destOrd="0" presId="urn:microsoft.com/office/officeart/2005/8/layout/vList2"/>
-    <dgm:cxn modelId="{38448A4A-E07F-4F73-8EA7-FB10D94F4A0A}" type="presOf" srcId="{F441001E-6347-43AB-ACFD-650031A5166E}" destId="{734875A9-DF35-4D71-BCAF-AB0B128F1338}" srcOrd="0" destOrd="0" presId="urn:microsoft.com/office/officeart/2005/8/layout/vList2"/>
-    <dgm:cxn modelId="{FE0D4B4E-BF13-4814-8090-6EC54296BF5E}" type="presOf" srcId="{D491DCF7-538A-4B90-92D1-426BA86D1D17}" destId="{B0240379-8454-4965-AB02-BE8DFBA46394}" srcOrd="0" destOrd="0" presId="urn:microsoft.com/office/officeart/2005/8/layout/vList2"/>
-    <dgm:cxn modelId="{DDA54052-C3A0-4BCA-9F70-2AF94A0D99D9}" type="presOf" srcId="{FCC5EB99-0189-455A-919F-64281EE814A9}" destId="{89E08625-7F36-4A1F-8391-7D72A0885382}" srcOrd="0" destOrd="0" presId="urn:microsoft.com/office/officeart/2005/8/layout/vList2"/>
-    <dgm:cxn modelId="{B0A8CD52-C694-4546-A707-6316E28B1073}" srcId="{0CC4204E-4E00-4F80-995D-90AB35516B41}" destId="{E8F56E97-412C-4172-AD8E-2F0E80656ED4}" srcOrd="0" destOrd="0" parTransId="{56C5B4C6-DF60-48AC-9923-7805C6E467DA}" sibTransId="{9B5A7948-72D6-4F6E-A9C6-C18FD16C3D46}"/>
-    <dgm:cxn modelId="{207A5791-2587-41DE-90AF-55660FB289AD}" type="presOf" srcId="{B27C3A9F-9554-47AE-98C9-07C67B84D136}" destId="{43CAB317-6D3E-4B76-9DF6-07B4AFBFE786}" srcOrd="0" destOrd="0" presId="urn:microsoft.com/office/officeart/2005/8/layout/vList2"/>
-    <dgm:cxn modelId="{8BD83AAB-3124-4F59-9148-540A2086CAB0}" srcId="{7E2D2691-3D14-43E6-A9E5-BC35CA444289}" destId="{0CC4204E-4E00-4F80-995D-90AB35516B41}" srcOrd="3" destOrd="0" parTransId="{1783D2AA-78D8-48B2-85F3-F3FD5F89F5A6}" sibTransId="{7365EEC1-146B-4853-B0CE-51A0D184F9DE}"/>
-    <dgm:cxn modelId="{50EBE8B7-253C-4EA9-885B-44451D9F335C}" srcId="{A1BF7326-E5BD-408F-8482-FEB1A58EFE63}" destId="{61225D35-1412-4845-B52E-AFD17D919B42}" srcOrd="0" destOrd="0" parTransId="{EA240431-4D0B-4B5C-B7F9-37EE175D155C}" sibTransId="{1D0E24DE-4F75-465E-9361-60FD3B10E0C9}"/>
-    <dgm:cxn modelId="{AEC5C7B9-C968-4F78-81B6-FA00F2826EA8}" type="presOf" srcId="{9DB47A99-8901-4143-9EFE-5688CF9DEBE0}" destId="{364220FD-3EF2-422A-A322-24ECEF43A84F}" srcOrd="0" destOrd="0" presId="urn:microsoft.com/office/officeart/2005/8/layout/vList2"/>
-    <dgm:cxn modelId="{D93B20BD-BBFF-46E5-B2C8-F668C2D1426B}" srcId="{B27C3A9F-9554-47AE-98C9-07C67B84D136}" destId="{D491DCF7-538A-4B90-92D1-426BA86D1D17}" srcOrd="0" destOrd="0" parTransId="{2082CA8E-ADF5-462A-A1B7-DF851BA421A7}" sibTransId="{7C2E1EDD-93B5-4108-8ECC-B4FEBF7F4B46}"/>
-    <dgm:cxn modelId="{748345C2-24A7-4E65-9F0B-F3B1EF4166B8}" srcId="{FCC5EB99-0189-455A-919F-64281EE814A9}" destId="{9DB47A99-8901-4143-9EFE-5688CF9DEBE0}" srcOrd="0" destOrd="0" parTransId="{52773EE8-BFD8-44C9-913C-FB11E9D3E1A0}" sibTransId="{3CB05F45-EC10-415D-A533-56C963484BFE}"/>
-    <dgm:cxn modelId="{A6DEA6C7-F274-42DC-9808-E794B349EC74}" type="presOf" srcId="{61225D35-1412-4845-B52E-AFD17D919B42}" destId="{D6EC59F5-0F4B-46C9-A10F-274F2A83C0F7}" srcOrd="0" destOrd="0" presId="urn:microsoft.com/office/officeart/2005/8/layout/vList2"/>
-    <dgm:cxn modelId="{0AA675D1-0E99-402B-9118-A5AE46E6DC44}" srcId="{7E2D2691-3D14-43E6-A9E5-BC35CA444289}" destId="{FCC5EB99-0189-455A-919F-64281EE814A9}" srcOrd="2" destOrd="0" parTransId="{6E87FE38-6CBC-4750-A421-7E24FA7BCAA7}" sibTransId="{FA512BC8-B086-43CD-B45D-BC1E48BF854A}"/>
-    <dgm:cxn modelId="{B072A1EE-11EF-408B-B0FF-52491FA2895F}" srcId="{7E2D2691-3D14-43E6-A9E5-BC35CA444289}" destId="{B27C3A9F-9554-47AE-98C9-07C67B84D136}" srcOrd="4" destOrd="0" parTransId="{CE41282A-FDFE-4415-A517-6543734A3B52}" sibTransId="{AA938921-ADD6-4017-8229-1A7734A2CC4F}"/>
     <dgm:cxn modelId="{8F86CCC5-AC6A-4B9B-BCD8-491172ABADD5}" type="presParOf" srcId="{99CD70DE-6DD2-4790-B082-E21E45F152DF}" destId="{734875A9-DF35-4D71-BCAF-AB0B128F1338}" srcOrd="0" destOrd="0" presId="urn:microsoft.com/office/officeart/2005/8/layout/vList2"/>
     <dgm:cxn modelId="{6EAD4DBC-47F6-41D0-8911-C1B37E4A7277}" type="presParOf" srcId="{99CD70DE-6DD2-4790-B082-E21E45F152DF}" destId="{4656F6B9-0B5C-4A8C-8068-E41621E2757F}" srcOrd="1" destOrd="0" presId="urn:microsoft.com/office/officeart/2005/8/layout/vList2"/>
     <dgm:cxn modelId="{A8D7F5AC-FBB1-4022-B093-91B5BD140ACC}" type="presParOf" srcId="{99CD70DE-6DD2-4790-B082-E21E45F152DF}" destId="{B6AF7AD7-3201-4241-BDA7-8D8F37824F30}" srcOrd="2" destOrd="0" presId="urn:microsoft.com/office/officeart/2005/8/layout/vList2"/>
@@ -2198,7 +2275,7 @@
         <a:lstStyle/>
         <a:p>
           <a:r>
-            <a:rPr lang="en-US"/>
+            <a:rPr lang="en-US" dirty="0"/>
             <a:t>Generates the targets for the model to represent and the requirements to verify against.</a:t>
           </a:r>
         </a:p>
@@ -2271,6 +2348,13 @@
         </dgm:presLayoutVars>
       </dgm:prSet>
       <dgm:spPr/>
+      <dgm:t>
+        <a:bodyPr/>
+        <a:lstStyle/>
+        <a:p>
+          <a:endParaRPr lang="en-US"/>
+        </a:p>
+      </dgm:t>
     </dgm:pt>
     <dgm:pt modelId="{BD2E4AC9-9DFB-42D4-B1BD-A257BA7C5060}" type="pres">
       <dgm:prSet presAssocID="{AC6F1025-A925-4362-A2CF-6BD2FAEF3E74}" presName="boxAndChildren" presStyleCnt="0"/>
@@ -2279,6 +2363,13 @@
     <dgm:pt modelId="{FFA5F1D1-1C8E-4EB2-B221-03B863503387}" type="pres">
       <dgm:prSet presAssocID="{AC6F1025-A925-4362-A2CF-6BD2FAEF3E74}" presName="parentTextBox" presStyleLbl="node1" presStyleIdx="0" presStyleCnt="2"/>
       <dgm:spPr/>
+      <dgm:t>
+        <a:bodyPr/>
+        <a:lstStyle/>
+        <a:p>
+          <a:endParaRPr lang="en-US"/>
+        </a:p>
+      </dgm:t>
     </dgm:pt>
     <dgm:pt modelId="{C96449D7-AAD4-4C94-96D9-35810084E17E}" type="pres">
       <dgm:prSet presAssocID="{86822A0C-542D-4AEC-921A-CD43766A160E}" presName="sp" presStyleCnt="0"/>
@@ -2291,14 +2382,21 @@
     <dgm:pt modelId="{51D411FA-7A18-4940-99A6-23B1EF0E5600}" type="pres">
       <dgm:prSet presAssocID="{E8C77936-1DE1-49F9-9AD4-FE7E7306073A}" presName="parentTextArrow" presStyleLbl="node1" presStyleIdx="1" presStyleCnt="2"/>
       <dgm:spPr/>
+      <dgm:t>
+        <a:bodyPr/>
+        <a:lstStyle/>
+        <a:p>
+          <a:endParaRPr lang="en-US"/>
+        </a:p>
+      </dgm:t>
     </dgm:pt>
   </dgm:ptLst>
   <dgm:cxnLst>
+    <dgm:cxn modelId="{D126EEDC-D987-4D4A-B25C-6C15C7C7382A}" srcId="{7CB6D944-A413-42EB-8CA6-0AE50AA67C5C}" destId="{E8C77936-1DE1-49F9-9AD4-FE7E7306073A}" srcOrd="0" destOrd="0" parTransId="{493F0BD5-6DD9-46CA-A8C4-7342BAB3A64E}" sibTransId="{86822A0C-542D-4AEC-921A-CD43766A160E}"/>
     <dgm:cxn modelId="{A816F776-D156-43E1-805F-1FAA2EA18C0D}" type="presOf" srcId="{7CB6D944-A413-42EB-8CA6-0AE50AA67C5C}" destId="{4CEF0223-F980-40D8-B0F2-FE8A45407289}" srcOrd="0" destOrd="0" presId="urn:microsoft.com/office/officeart/2005/8/layout/process4"/>
+    <dgm:cxn modelId="{D9499382-FBA3-4899-989A-D2DFC41AE812}" type="presOf" srcId="{E8C77936-1DE1-49F9-9AD4-FE7E7306073A}" destId="{51D411FA-7A18-4940-99A6-23B1EF0E5600}" srcOrd="0" destOrd="0" presId="urn:microsoft.com/office/officeart/2005/8/layout/process4"/>
     <dgm:cxn modelId="{A5BFAE79-F84C-44E1-84BC-CD33E4403BAD}" srcId="{7CB6D944-A413-42EB-8CA6-0AE50AA67C5C}" destId="{AC6F1025-A925-4362-A2CF-6BD2FAEF3E74}" srcOrd="1" destOrd="0" parTransId="{7B8C3022-D12A-46DA-A026-40987CC23A84}" sibTransId="{06DD5E00-C16E-4E4C-ABFA-6BDF59458F08}"/>
-    <dgm:cxn modelId="{D9499382-FBA3-4899-989A-D2DFC41AE812}" type="presOf" srcId="{E8C77936-1DE1-49F9-9AD4-FE7E7306073A}" destId="{51D411FA-7A18-4940-99A6-23B1EF0E5600}" srcOrd="0" destOrd="0" presId="urn:microsoft.com/office/officeart/2005/8/layout/process4"/>
     <dgm:cxn modelId="{0BD96892-9FF0-4B94-BA88-614496AFA234}" type="presOf" srcId="{AC6F1025-A925-4362-A2CF-6BD2FAEF3E74}" destId="{FFA5F1D1-1C8E-4EB2-B221-03B863503387}" srcOrd="0" destOrd="0" presId="urn:microsoft.com/office/officeart/2005/8/layout/process4"/>
-    <dgm:cxn modelId="{D126EEDC-D987-4D4A-B25C-6C15C7C7382A}" srcId="{7CB6D944-A413-42EB-8CA6-0AE50AA67C5C}" destId="{E8C77936-1DE1-49F9-9AD4-FE7E7306073A}" srcOrd="0" destOrd="0" parTransId="{493F0BD5-6DD9-46CA-A8C4-7342BAB3A64E}" sibTransId="{86822A0C-542D-4AEC-921A-CD43766A160E}"/>
     <dgm:cxn modelId="{74C677DC-C565-44A4-9762-4D66F25877B9}" type="presParOf" srcId="{4CEF0223-F980-40D8-B0F2-FE8A45407289}" destId="{BD2E4AC9-9DFB-42D4-B1BD-A257BA7C5060}" srcOrd="0" destOrd="0" presId="urn:microsoft.com/office/officeart/2005/8/layout/process4"/>
     <dgm:cxn modelId="{CAB44BD5-A9FF-4587-9431-5BE04A8037F1}" type="presParOf" srcId="{BD2E4AC9-9DFB-42D4-B1BD-A257BA7C5060}" destId="{FFA5F1D1-1C8E-4EB2-B221-03B863503387}" srcOrd="0" destOrd="0" presId="urn:microsoft.com/office/officeart/2005/8/layout/process4"/>
     <dgm:cxn modelId="{86D30AAD-1608-4034-A745-89E4F4664F96}" type="presParOf" srcId="{4CEF0223-F980-40D8-B0F2-FE8A45407289}" destId="{C96449D7-AAD4-4C94-96D9-35810084E17E}" srcOrd="1" destOrd="0" presId="urn:microsoft.com/office/officeart/2005/8/layout/process4"/>
@@ -2377,7 +2475,7 @@
         </a:bodyPr>
         <a:lstStyle/>
         <a:p>
-          <a:pPr marL="0" lvl="0" indent="0" algn="l" defTabSz="933450">
+          <a:pPr lvl="0" algn="l" defTabSz="933450">
             <a:lnSpc>
               <a:spcPct val="90000"/>
             </a:lnSpc>
@@ -2387,7 +2485,6 @@
             <a:spcAft>
               <a:spcPct val="35000"/>
             </a:spcAft>
-            <a:buNone/>
           </a:pPr>
           <a:r>
             <a:rPr lang="en-US" sz="2100" b="1" kern="1200" dirty="0"/>
@@ -2447,7 +2544,7 @@
             <a:spcAft>
               <a:spcPct val="20000"/>
             </a:spcAft>
-            <a:buChar char="•"/>
+            <a:buChar char="••"/>
           </a:pPr>
           <a:r>
             <a:rPr lang="en-US" sz="1600" kern="1200" dirty="0"/>
@@ -2514,7 +2611,7 @@
         </a:bodyPr>
         <a:lstStyle/>
         <a:p>
-          <a:pPr marL="0" lvl="0" indent="0" algn="l" defTabSz="933450">
+          <a:pPr lvl="0" algn="l" defTabSz="933450">
             <a:lnSpc>
               <a:spcPct val="90000"/>
             </a:lnSpc>
@@ -2524,7 +2621,6 @@
             <a:spcAft>
               <a:spcPct val="35000"/>
             </a:spcAft>
-            <a:buNone/>
           </a:pPr>
           <a:r>
             <a:rPr lang="en-US" sz="2100" b="1" kern="1200" dirty="0"/>
@@ -2584,7 +2680,7 @@
             <a:spcAft>
               <a:spcPct val="20000"/>
             </a:spcAft>
-            <a:buChar char="•"/>
+            <a:buChar char="••"/>
           </a:pPr>
           <a:r>
             <a:rPr lang="en-US" sz="1600" kern="1200" dirty="0"/>
@@ -2651,7 +2747,7 @@
         </a:bodyPr>
         <a:lstStyle/>
         <a:p>
-          <a:pPr marL="0" lvl="0" indent="0" algn="l" defTabSz="933450">
+          <a:pPr lvl="0" algn="l" defTabSz="933450">
             <a:lnSpc>
               <a:spcPct val="90000"/>
             </a:lnSpc>
@@ -2661,7 +2757,6 @@
             <a:spcAft>
               <a:spcPct val="35000"/>
             </a:spcAft>
-            <a:buNone/>
           </a:pPr>
           <a:r>
             <a:rPr lang="en-US" sz="2100" b="1" kern="1200" dirty="0"/>
@@ -2721,7 +2816,7 @@
             <a:spcAft>
               <a:spcPct val="20000"/>
             </a:spcAft>
-            <a:buChar char="•"/>
+            <a:buChar char="••"/>
           </a:pPr>
           <a:r>
             <a:rPr lang="en-US" sz="1600" kern="1200" dirty="0"/>
@@ -2788,7 +2883,7 @@
         </a:bodyPr>
         <a:lstStyle/>
         <a:p>
-          <a:pPr marL="0" lvl="0" indent="0" algn="l" defTabSz="933450">
+          <a:pPr lvl="0" algn="l" defTabSz="933450">
             <a:lnSpc>
               <a:spcPct val="90000"/>
             </a:lnSpc>
@@ -2798,7 +2893,6 @@
             <a:spcAft>
               <a:spcPct val="35000"/>
             </a:spcAft>
-            <a:buNone/>
           </a:pPr>
           <a:r>
             <a:rPr lang="en-US" sz="2100" b="1" kern="1200" dirty="0"/>
@@ -2858,7 +2952,7 @@
             <a:spcAft>
               <a:spcPct val="20000"/>
             </a:spcAft>
-            <a:buChar char="•"/>
+            <a:buChar char="••"/>
           </a:pPr>
           <a:r>
             <a:rPr lang="en-US" sz="1600" kern="1200" dirty="0"/>
@@ -2925,7 +3019,7 @@
         </a:bodyPr>
         <a:lstStyle/>
         <a:p>
-          <a:pPr marL="0" lvl="0" indent="0" algn="l" defTabSz="933450">
+          <a:pPr lvl="0" algn="l" defTabSz="933450">
             <a:lnSpc>
               <a:spcPct val="90000"/>
             </a:lnSpc>
@@ -2935,7 +3029,6 @@
             <a:spcAft>
               <a:spcPct val="35000"/>
             </a:spcAft>
-            <a:buNone/>
           </a:pPr>
           <a:r>
             <a:rPr lang="en-US" sz="2100" b="1" kern="1200" dirty="0"/>
@@ -2995,7 +3088,7 @@
             <a:spcAft>
               <a:spcPct val="20000"/>
             </a:spcAft>
-            <a:buChar char="•"/>
+            <a:buChar char="••"/>
           </a:pPr>
           <a:r>
             <a:rPr lang="en-US" sz="1600" kern="1200" dirty="0"/>
@@ -3082,7 +3175,7 @@
         </a:bodyPr>
         <a:lstStyle/>
         <a:p>
-          <a:pPr marL="0" lvl="0" indent="0" algn="ctr" defTabSz="1111250">
+          <a:pPr lvl="0" algn="ctr" defTabSz="1111250">
             <a:lnSpc>
               <a:spcPct val="90000"/>
             </a:lnSpc>
@@ -3092,7 +3185,6 @@
             <a:spcAft>
               <a:spcPct val="35000"/>
             </a:spcAft>
-            <a:buNone/>
           </a:pPr>
           <a:r>
             <a:rPr lang="en-US" sz="2500" kern="1200" dirty="0"/>
@@ -3159,7 +3251,7 @@
         </a:bodyPr>
         <a:lstStyle/>
         <a:p>
-          <a:pPr marL="0" lvl="0" indent="0" algn="ctr" defTabSz="1111250">
+          <a:pPr lvl="0" algn="ctr" defTabSz="1111250">
             <a:lnSpc>
               <a:spcPct val="90000"/>
             </a:lnSpc>
@@ -3169,10 +3261,9 @@
             <a:spcAft>
               <a:spcPct val="35000"/>
             </a:spcAft>
-            <a:buNone/>
           </a:pPr>
           <a:r>
-            <a:rPr lang="en-US" sz="2500" kern="1200"/>
+            <a:rPr lang="en-US" sz="2500" kern="1200" dirty="0"/>
             <a:t>Generates the targets for the model to represent and the requirements to verify against.</a:t>
           </a:r>
         </a:p>
@@ -5856,7 +5947,7 @@
           <a:p>
             <a:fld id="{E8C32C30-3C9C-4889-B4A5-49526D5A29D4}" type="datetimeFigureOut">
               <a:rPr lang="en-IN" smtClean="0"/>
-              <a:t>09-04-2022</a:t>
+              <a:t>11-04-2022</a:t>
             </a:fld>
             <a:endParaRPr lang="en-IN"/>
           </a:p>
@@ -6350,7 +6441,7 @@
           <a:p>
             <a:fld id="{E4D174B4-0779-4249-B768-C3159E9D88C9}" type="datetime1">
               <a:rPr lang="en-IN" smtClean="0"/>
-              <a:t>09-04-2022</a:t>
+              <a:t>11-04-2022</a:t>
             </a:fld>
             <a:endParaRPr lang="en-IN"/>
           </a:p>
@@ -6558,7 +6649,7 @@
           <a:p>
             <a:fld id="{55C7FD4F-0011-4233-9320-F03266C986FE}" type="datetime1">
               <a:rPr lang="en-IN" smtClean="0"/>
-              <a:t>09-04-2022</a:t>
+              <a:t>11-04-2022</a:t>
             </a:fld>
             <a:endParaRPr lang="en-IN"/>
           </a:p>
@@ -6814,7 +6905,7 @@
           <a:p>
             <a:fld id="{0CB019B6-C5FF-48DC-952A-1BA2CE93F7ED}" type="datetime1">
               <a:rPr lang="en-IN" smtClean="0"/>
-              <a:t>09-04-2022</a:t>
+              <a:t>11-04-2022</a:t>
             </a:fld>
             <a:endParaRPr lang="en-IN"/>
           </a:p>
@@ -6984,7 +7075,7 @@
           <a:p>
             <a:fld id="{FB167C80-E6DC-41E6-80D2-BF6CCB0B1540}" type="datetime1">
               <a:rPr lang="en-IN" smtClean="0"/>
-              <a:t>09-04-2022</a:t>
+              <a:t>11-04-2022</a:t>
             </a:fld>
             <a:endParaRPr lang="en-IN"/>
           </a:p>
@@ -7327,7 +7418,7 @@
           <a:p>
             <a:fld id="{51CB3EF5-D528-4CBA-8CFD-BD396D6FE4E8}" type="datetime1">
               <a:rPr lang="en-IN" smtClean="0"/>
-              <a:t>09-04-2022</a:t>
+              <a:t>11-04-2022</a:t>
             </a:fld>
             <a:endParaRPr lang="en-IN"/>
           </a:p>
@@ -7602,7 +7693,7 @@
           <a:p>
             <a:fld id="{57BFCE4C-C747-4895-A5E5-2E1B94859C0B}" type="datetime1">
               <a:rPr lang="en-IN" smtClean="0"/>
-              <a:t>09-04-2022</a:t>
+              <a:t>11-04-2022</a:t>
             </a:fld>
             <a:endParaRPr lang="en-IN"/>
           </a:p>
@@ -7981,7 +8072,7 @@
           <a:p>
             <a:fld id="{E6A374BE-E074-4C36-AC3D-BD32CDD432F7}" type="datetime1">
               <a:rPr lang="en-IN" smtClean="0"/>
-              <a:t>09-04-2022</a:t>
+              <a:t>11-04-2022</a:t>
             </a:fld>
             <a:endParaRPr lang="en-IN"/>
           </a:p>
@@ -8099,7 +8190,7 @@
           <a:p>
             <a:fld id="{048D8330-447D-4113-A6CA-C7241120160E}" type="datetime1">
               <a:rPr lang="en-IN" smtClean="0"/>
-              <a:t>09-04-2022</a:t>
+              <a:t>11-04-2022</a:t>
             </a:fld>
             <a:endParaRPr lang="en-IN"/>
           </a:p>
@@ -8270,7 +8361,7 @@
           <a:p>
             <a:fld id="{C8C630D0-511E-4450-BC0B-3AD23827FED4}" type="datetime1">
               <a:rPr lang="en-IN" smtClean="0"/>
-              <a:t>09-04-2022</a:t>
+              <a:t>11-04-2022</a:t>
             </a:fld>
             <a:endParaRPr lang="en-IN"/>
           </a:p>
@@ -8624,7 +8715,7 @@
           <a:p>
             <a:fld id="{9CEE32F4-F6E0-4558-BAEF-66F971474D1A}" type="datetime1">
               <a:rPr lang="en-IN" smtClean="0"/>
-              <a:t>09-04-2022</a:t>
+              <a:t>11-04-2022</a:t>
             </a:fld>
             <a:endParaRPr lang="en-IN"/>
           </a:p>
@@ -9001,7 +9092,7 @@
           <a:p>
             <a:fld id="{DADAB254-044E-4DE4-B252-F9C84BCF4756}" type="datetime1">
               <a:rPr lang="en-IN" smtClean="0"/>
-              <a:t>09-04-2022</a:t>
+              <a:t>11-04-2022</a:t>
             </a:fld>
             <a:endParaRPr lang="en-IN"/>
           </a:p>
@@ -9288,7 +9379,7 @@
           <a:p>
             <a:fld id="{3FCD19FB-82A4-4E3D-866E-F424E6C606E0}" type="datetime1">
               <a:rPr lang="en-IN" smtClean="0"/>
-              <a:t>09-04-2022</a:t>
+              <a:t>11-04-2022</a:t>
             </a:fld>
             <a:endParaRPr lang="en-IN"/>
           </a:p>
@@ -10170,6 +10261,13 @@
   <p:clrMapOvr>
     <a:masterClrMapping/>
   </p:clrMapOvr>
+  <p:timing>
+    <p:tnLst>
+      <p:par>
+        <p:cTn id="1" dur="indefinite" restart="never" nodeType="tmRoot"/>
+      </p:par>
+    </p:tnLst>
+  </p:timing>
 </p:sld>
 </file>
 
@@ -10206,7 +10304,7 @@
                 <a16:creationId xmlns:a16="http://schemas.microsoft.com/office/drawing/2014/main" id="{038B8727-D318-4B70-B353-C390602FF311}"/>
               </a:ext>
               <a:ext uri="{C183D7F6-B498-43B3-948B-1728B52AA6E4}">
-                <adec:decorative xmlns:adec="http://schemas.microsoft.com/office/drawing/2017/decorative" val="1"/>
+                <adec:decorative xmlns:adec="http://schemas.microsoft.com/office/drawing/2017/decorative" xmlns="" val="1"/>
               </a:ext>
             </a:extLst>
           </p:cNvPr>
@@ -10266,7 +10364,7 @@
                 <a16:creationId xmlns:a16="http://schemas.microsoft.com/office/drawing/2014/main" id="{1B0C8367-28B6-4EF1-B182-01BEC98727DB}"/>
               </a:ext>
               <a:ext uri="{C183D7F6-B498-43B3-948B-1728B52AA6E4}">
-                <adec:decorative xmlns:adec="http://schemas.microsoft.com/office/drawing/2017/decorative" val="1"/>
+                <adec:decorative xmlns:adec="http://schemas.microsoft.com/office/drawing/2017/decorative" xmlns="" val="1"/>
               </a:ext>
             </a:extLst>
           </p:cNvPr>
@@ -10326,7 +10424,7 @@
         <p:spPr>
           <a:xfrm>
             <a:off x="492370" y="516835"/>
-            <a:ext cx="3084844" cy="2103875"/>
+            <a:ext cx="3084844" cy="1830125"/>
           </a:xfrm>
         </p:spPr>
         <p:txBody>
@@ -10336,14 +10434,14 @@
           <a:lstStyle/>
           <a:p>
             <a:r>
-              <a:rPr lang="en-US" sz="3600" b="1">
+              <a:rPr lang="en-US" sz="3600" b="1" dirty="0">
                 <a:solidFill>
                   <a:srgbClr val="FFFFFF"/>
                 </a:solidFill>
               </a:rPr>
               <a:t>Turn 360° Test </a:t>
             </a:r>
-            <a:endParaRPr lang="en-IN" sz="3600" b="1">
+            <a:endParaRPr lang="en-IN" sz="3600" b="1" dirty="0">
               <a:solidFill>
                 <a:srgbClr val="FFFFFF"/>
               </a:solidFill>
@@ -10380,7 +10478,7 @@
           <a:lstStyle/>
           <a:p>
             <a:r>
-              <a:rPr lang="en-US" sz="1500" dirty="0">
+              <a:rPr lang="en-US" dirty="0">
                 <a:solidFill>
                   <a:srgbClr val="FFFFFF"/>
                 </a:solidFill>
@@ -10390,7 +10488,7 @@
           </a:p>
           <a:p>
             <a:r>
-              <a:rPr lang="en-US" sz="1500" dirty="0">
+              <a:rPr lang="en-US" dirty="0">
                 <a:solidFill>
                   <a:srgbClr val="FFFFFF"/>
                 </a:solidFill>
@@ -10408,7 +10506,7 @@
                 <a16:creationId xmlns:a16="http://schemas.microsoft.com/office/drawing/2014/main" id="{649E3F4C-17F5-49E4-B05F-80C6B348AF28}"/>
               </a:ext>
               <a:ext uri="{C183D7F6-B498-43B3-948B-1728B52AA6E4}">
-                <adec:decorative xmlns:adec="http://schemas.microsoft.com/office/drawing/2017/decorative" val="1"/>
+                <adec:decorative xmlns:adec="http://schemas.microsoft.com/office/drawing/2017/decorative" xmlns="" val="1"/>
               </a:ext>
             </a:extLst>
           </p:cNvPr>
@@ -10543,6 +10641,13 @@
   <p:clrMapOvr>
     <a:masterClrMapping/>
   </p:clrMapOvr>
+  <p:timing>
+    <p:tnLst>
+      <p:par>
+        <p:cTn id="1" dur="indefinite" restart="never" nodeType="tmRoot"/>
+      </p:par>
+    </p:tnLst>
+  </p:timing>
 </p:sld>
 </file>
 
@@ -10579,7 +10684,7 @@
                 <a16:creationId xmlns:a16="http://schemas.microsoft.com/office/drawing/2014/main" id="{F83BAE65-D215-4292-9498-D9610AC2C69F}"/>
               </a:ext>
               <a:ext uri="{C183D7F6-B498-43B3-948B-1728B52AA6E4}">
-                <adec:decorative xmlns:adec="http://schemas.microsoft.com/office/drawing/2017/decorative" val="1"/>
+                <adec:decorative xmlns:adec="http://schemas.microsoft.com/office/drawing/2017/decorative" xmlns="" val="1"/>
               </a:ext>
             </a:extLst>
           </p:cNvPr>
@@ -10699,7 +10804,7 @@
                 <a16:creationId xmlns:a16="http://schemas.microsoft.com/office/drawing/2014/main" id="{5C99ACED-3F9B-471D-97BC-E5D2D23198C0}"/>
               </a:ext>
               <a:ext uri="{C183D7F6-B498-43B3-948B-1728B52AA6E4}">
-                <adec:decorative xmlns:adec="http://schemas.microsoft.com/office/drawing/2017/decorative" val="1"/>
+                <adec:decorative xmlns:adec="http://schemas.microsoft.com/office/drawing/2017/decorative" xmlns="" val="1"/>
               </a:ext>
             </a:extLst>
           </p:cNvPr>
@@ -10802,7 +10907,7 @@
                 <a16:creationId xmlns:a16="http://schemas.microsoft.com/office/drawing/2014/main" id="{86C05757-249C-4F2B-B326-B940FDD9C439}"/>
               </a:ext>
               <a:ext uri="{C183D7F6-B498-43B3-948B-1728B52AA6E4}">
-                <adec:decorative xmlns:adec="http://schemas.microsoft.com/office/drawing/2017/decorative" val="1"/>
+                <adec:decorative xmlns:adec="http://schemas.microsoft.com/office/drawing/2017/decorative" xmlns="" val="1"/>
               </a:ext>
             </a:extLst>
           </p:cNvPr>
@@ -10857,7 +10962,7 @@
                 <a16:creationId xmlns:a16="http://schemas.microsoft.com/office/drawing/2014/main" id="{EE922679-5189-4C5C-9FBB-6839F89C665D}"/>
               </a:ext>
               <a:ext uri="{C183D7F6-B498-43B3-948B-1728B52AA6E4}">
-                <adec:decorative xmlns:adec="http://schemas.microsoft.com/office/drawing/2017/decorative" val="1"/>
+                <adec:decorative xmlns:adec="http://schemas.microsoft.com/office/drawing/2017/decorative" xmlns="" val="1"/>
               </a:ext>
             </a:extLst>
           </p:cNvPr>
@@ -10954,6 +11059,13 @@
   <p:clrMapOvr>
     <a:masterClrMapping/>
   </p:clrMapOvr>
+  <p:timing>
+    <p:tnLst>
+      <p:par>
+        <p:cTn id="1" dur="indefinite" restart="never" nodeType="tmRoot"/>
+      </p:par>
+    </p:tnLst>
+  </p:timing>
 </p:sld>
 </file>
 
@@ -12357,6 +12469,13 @@
   <p:clrMapOvr>
     <a:masterClrMapping/>
   </p:clrMapOvr>
+  <p:timing>
+    <p:tnLst>
+      <p:par>
+        <p:cTn id="1" dur="indefinite" restart="never" nodeType="tmRoot"/>
+      </p:par>
+    </p:tnLst>
+  </p:timing>
 </p:sld>
 </file>
 
@@ -12781,6 +12900,13 @@
   <p:clrMapOvr>
     <a:masterClrMapping/>
   </p:clrMapOvr>
+  <p:timing>
+    <p:tnLst>
+      <p:par>
+        <p:cTn id="1" dur="indefinite" restart="never" nodeType="tmRoot"/>
+      </p:par>
+    </p:tnLst>
+  </p:timing>
 </p:sld>
 </file>
 
@@ -12886,7 +13012,15 @@
             </a:pPr>
             <a:r>
               <a:rPr lang="en-IN" sz="3400" dirty="0"/>
-              <a:t>Safety requirement analysis is made based on hazard analysis, lane control, automatic braking system and accidental failures.</a:t>
+              <a:t>Safety requirement analysis is made based on hazard analysis, lane control, automatic braking </a:t>
+            </a:r>
+            <a:r>
+              <a:rPr lang="en-IN" sz="3400" dirty="0" smtClean="0"/>
+              <a:t>system, steering rotation, stability of vehicle and </a:t>
+            </a:r>
+            <a:r>
+              <a:rPr lang="en-IN" sz="3400" dirty="0"/>
+              <a:t>accidental failures.</a:t>
             </a:r>
           </a:p>
           <a:p>
@@ -12940,6 +13074,13 @@
   <p:clrMapOvr>
     <a:masterClrMapping/>
   </p:clrMapOvr>
+  <p:timing>
+    <p:tnLst>
+      <p:par>
+        <p:cTn id="1" dur="indefinite" restart="never" nodeType="tmRoot"/>
+      </p:par>
+    </p:tnLst>
+  </p:timing>
 </p:sld>
 </file>
 
@@ -13046,6 +13187,13 @@
   <p:clrMapOvr>
     <a:masterClrMapping/>
   </p:clrMapOvr>
+  <p:timing>
+    <p:tnLst>
+      <p:par>
+        <p:cTn id="1" dur="indefinite" restart="never" nodeType="tmRoot"/>
+      </p:par>
+    </p:tnLst>
+  </p:timing>
 </p:sld>
 </file>
 
@@ -13147,8 +13295,19 @@
           <a:p>
             <a:r>
               <a:rPr lang="en-US" sz="2400" dirty="0"/>
-              <a:t>6.  Lane control &amp; Seamless Lane Merge</a:t>
-            </a:r>
+              <a:t>6.  Lane control &amp; Seamless Lane </a:t>
+            </a:r>
+            <a:r>
+              <a:rPr lang="en-US" sz="2400" dirty="0" smtClean="0"/>
+              <a:t>Merge</a:t>
+            </a:r>
+          </a:p>
+          <a:p>
+            <a:r>
+              <a:rPr lang="en-US" sz="2400" dirty="0" smtClean="0"/>
+              <a:t>7.  Reverse Parking in lane</a:t>
+            </a:r>
+            <a:endParaRPr lang="en-US" sz="2400" dirty="0"/>
           </a:p>
         </p:txBody>
       </p:sp>
@@ -13185,20 +13344,19 @@
   <p:clrMapOvr>
     <a:masterClrMapping/>
   </p:clrMapOvr>
+  <p:timing>
+    <p:tnLst>
+      <p:par>
+        <p:cTn id="1" dur="indefinite" restart="never" nodeType="tmRoot"/>
+      </p:par>
+    </p:tnLst>
+  </p:timing>
 </p:sld>
 </file>
 
 <file path=ppt/slides/slide5.xml><?xml version="1.0" encoding="utf-8"?>
 <p:sld xmlns:a="http://schemas.openxmlformats.org/drawingml/2006/main" xmlns:r="http://schemas.openxmlformats.org/officeDocument/2006/relationships" xmlns:p="http://schemas.openxmlformats.org/presentationml/2006/main">
   <p:cSld>
-    <p:bg>
-      <p:bgPr>
-        <a:solidFill>
-          <a:schemeClr val="bg1"/>
-        </a:solidFill>
-        <a:effectLst/>
-      </p:bgPr>
-    </p:bg>
     <p:spTree>
       <p:nvGrpSpPr>
         <p:cNvPr id="1" name=""/>
@@ -13213,121 +13371,6 @@
           <a:chExt cx="0" cy="0"/>
         </a:xfrm>
       </p:grpSpPr>
-      <p:sp useBgFill="1">
-        <p:nvSpPr>
-          <p:cNvPr id="41" name="Rectangle 30">
-            <a:extLst>
-              <a:ext uri="{FF2B5EF4-FFF2-40B4-BE49-F238E27FC236}">
-                <a16:creationId xmlns:a16="http://schemas.microsoft.com/office/drawing/2014/main" id="{1A1C6406-8520-4CCB-B38F-6D4DAC19EC30}"/>
-              </a:ext>
-              <a:ext uri="{C183D7F6-B498-43B3-948B-1728B52AA6E4}">
-                <adec:decorative xmlns:adec="http://schemas.microsoft.com/office/drawing/2017/decorative" val="1"/>
-              </a:ext>
-            </a:extLst>
-          </p:cNvPr>
-          <p:cNvSpPr>
-            <a:spLocks noGrp="1" noRot="1" noChangeAspect="1" noMove="1" noResize="1" noEditPoints="1" noAdjustHandles="1" noChangeArrowheads="1" noChangeShapeType="1" noTextEdit="1"/>
-          </p:cNvSpPr>
-          <p:nvPr>
-            <p:extLst>
-              <p:ext uri="{386F3935-93C4-4BCD-93E2-E3B085C9AB24}">
-                <p16:designElem xmlns:p16="http://schemas.microsoft.com/office/powerpoint/2015/main" val="1"/>
-              </p:ext>
-            </p:extLst>
-          </p:nvPr>
-        </p:nvSpPr>
-        <p:spPr>
-          <a:xfrm>
-            <a:off x="0" y="0"/>
-            <a:ext cx="12186315" cy="6858000"/>
-          </a:xfrm>
-          <a:prstGeom prst="rect">
-            <a:avLst/>
-          </a:prstGeom>
-          <a:ln>
-            <a:noFill/>
-          </a:ln>
-        </p:spPr>
-        <p:style>
-          <a:lnRef idx="2">
-            <a:schemeClr val="accent6">
-              <a:shade val="50000"/>
-            </a:schemeClr>
-          </a:lnRef>
-          <a:fillRef idx="1001">
-            <a:schemeClr val="lt1"/>
-          </a:fillRef>
-          <a:effectRef idx="0">
-            <a:schemeClr val="accent6"/>
-          </a:effectRef>
-          <a:fontRef idx="minor">
-            <a:schemeClr val="lt1"/>
-          </a:fontRef>
-        </p:style>
-        <p:txBody>
-          <a:bodyPr rtlCol="0" anchor="ctr"/>
-          <a:lstStyle/>
-          <a:p>
-            <a:pPr algn="ctr"/>
-            <a:endParaRPr lang="en-US"/>
-          </a:p>
-        </p:txBody>
-      </p:sp>
-      <p:sp>
-        <p:nvSpPr>
-          <p:cNvPr id="33" name="Rectangle 32">
-            <a:extLst>
-              <a:ext uri="{FF2B5EF4-FFF2-40B4-BE49-F238E27FC236}">
-                <a16:creationId xmlns:a16="http://schemas.microsoft.com/office/drawing/2014/main" id="{D2893A1F-D5D8-4034-A28F-4D8F18C46BCC}"/>
-              </a:ext>
-              <a:ext uri="{C183D7F6-B498-43B3-948B-1728B52AA6E4}">
-                <adec:decorative xmlns:adec="http://schemas.microsoft.com/office/drawing/2017/decorative" val="1"/>
-              </a:ext>
-            </a:extLst>
-          </p:cNvPr>
-          <p:cNvSpPr>
-            <a:spLocks noGrp="1" noRot="1" noChangeAspect="1" noMove="1" noResize="1" noEditPoints="1" noAdjustHandles="1" noChangeArrowheads="1" noChangeShapeType="1" noTextEdit="1"/>
-          </p:cNvSpPr>
-          <p:nvPr>
-            <p:extLst>
-              <p:ext uri="{386F3935-93C4-4BCD-93E2-E3B085C9AB24}">
-                <p16:designElem xmlns:p16="http://schemas.microsoft.com/office/powerpoint/2015/main" val="1"/>
-              </p:ext>
-            </p:extLst>
-          </p:nvPr>
-        </p:nvSpPr>
-        <p:spPr>
-          <a:xfrm>
-            <a:off x="16" y="0"/>
-            <a:ext cx="4590273" cy="6858000"/>
-          </a:xfrm>
-          <a:prstGeom prst="rect">
-            <a:avLst/>
-          </a:prstGeom>
-          <a:solidFill>
-            <a:schemeClr val="accent2"/>
-          </a:solidFill>
-          <a:ln>
-            <a:noFill/>
-          </a:ln>
-        </p:spPr>
-        <p:style>
-          <a:lnRef idx="2">
-            <a:schemeClr val="accent1">
-              <a:shade val="50000"/>
-            </a:schemeClr>
-          </a:lnRef>
-          <a:fillRef idx="1">
-            <a:schemeClr val="accent1"/>
-          </a:fillRef>
-          <a:effectRef idx="0">
-            <a:schemeClr val="accent1"/>
-          </a:effectRef>
-          <a:fontRef idx="minor">
-            <a:schemeClr val="lt1"/>
-          </a:fontRef>
-        </p:style>
-      </p:sp>
       <p:sp>
         <p:nvSpPr>
           <p:cNvPr id="2" name="Title 1"/>
@@ -13338,126 +13381,98 @@
             <p:ph type="title"/>
           </p:nvPr>
         </p:nvSpPr>
-        <p:spPr>
-          <a:xfrm>
-            <a:off x="492369" y="516835"/>
-            <a:ext cx="3735502" cy="2103875"/>
-          </a:xfrm>
-        </p:spPr>
+        <p:spPr/>
         <p:txBody>
           <a:bodyPr>
-            <a:normAutofit/>
+            <a:normAutofit fontScale="90000"/>
           </a:bodyPr>
           <a:lstStyle/>
           <a:p>
             <a:r>
-              <a:rPr lang="en-US" sz="2500" b="1">
-                <a:solidFill>
-                  <a:srgbClr val="FFFFFF"/>
-                </a:solidFill>
-              </a:rPr>
+              <a:rPr lang="en-US" sz="2800" b="1" dirty="0"/>
               <a:t>Model Based Autonomous Vehicle Control Design </a:t>
             </a:r>
+            <a:r>
+              <a:rPr lang="en-US" sz="2800" b="1" dirty="0" smtClean="0"/>
+              <a:t/>
+            </a:r>
             <a:br>
-              <a:rPr lang="en-US" sz="2500" b="1">
-                <a:solidFill>
-                  <a:srgbClr val="FFFFFF"/>
-                </a:solidFill>
-              </a:rPr>
+              <a:rPr lang="en-US" sz="2800" b="1" dirty="0" smtClean="0"/>
             </a:br>
+            <a:r>
+              <a:rPr lang="en-US" sz="2800" b="1" dirty="0"/>
+              <a:t/>
+            </a:r>
             <a:br>
-              <a:rPr lang="en-US" sz="2500" b="1">
-                <a:solidFill>
-                  <a:srgbClr val="FFFFFF"/>
-                </a:solidFill>
-              </a:rPr>
+              <a:rPr lang="en-US" sz="2800" b="1" dirty="0"/>
             </a:br>
             <a:r>
-              <a:rPr lang="en-US" sz="2500" b="1" i="1">
-                <a:solidFill>
-                  <a:srgbClr val="FFFFFF"/>
-                </a:solidFill>
-              </a:rPr>
+              <a:rPr lang="en-US" sz="2800" i="1" dirty="0"/>
               <a:t>Car Simulation Model – Block Diagram</a:t>
             </a:r>
-            <a:endParaRPr lang="en-IN" sz="2500" b="1" i="1">
-              <a:solidFill>
-                <a:srgbClr val="FFFFFF"/>
-              </a:solidFill>
-            </a:endParaRPr>
+            <a:r>
+              <a:rPr lang="en-IN" sz="2800" dirty="0"/>
+              <a:t/>
+            </a:r>
+            <a:br>
+              <a:rPr lang="en-IN" sz="2800" dirty="0"/>
+            </a:br>
+            <a:r>
+              <a:rPr lang="en-US" sz="2800" b="1" dirty="0"/>
+              <a:t/>
+            </a:r>
+            <a:br>
+              <a:rPr lang="en-US" sz="2800" b="1" dirty="0"/>
+            </a:br>
+            <a:endParaRPr lang="en-IN" sz="2800" dirty="0"/>
           </a:p>
         </p:txBody>
       </p:sp>
       <p:sp>
         <p:nvSpPr>
-          <p:cNvPr id="10" name="Content Placeholder 9">
-            <a:extLst>
-              <a:ext uri="{FF2B5EF4-FFF2-40B4-BE49-F238E27FC236}">
-                <a16:creationId xmlns:a16="http://schemas.microsoft.com/office/drawing/2014/main" id="{00C40D61-6993-2251-C065-402973F12657}"/>
-              </a:ext>
-            </a:extLst>
-          </p:cNvPr>
+          <p:cNvPr id="4" name="Text Placeholder 3"/>
           <p:cNvSpPr>
             <a:spLocks noGrp="1"/>
           </p:cNvSpPr>
           <p:nvPr>
-            <p:ph idx="1"/>
+            <p:ph type="body" sz="half" idx="2"/>
           </p:nvPr>
         </p:nvSpPr>
         <p:spPr>
           <a:xfrm>
-            <a:off x="492371" y="2653800"/>
-            <a:ext cx="3735500" cy="3335519"/>
+            <a:off x="457200" y="2631440"/>
+            <a:ext cx="3200400" cy="3673764"/>
           </a:xfrm>
         </p:spPr>
         <p:txBody>
-          <a:bodyPr>
-            <a:normAutofit/>
-          </a:bodyPr>
+          <a:bodyPr/>
           <a:lstStyle/>
           <a:p>
             <a:r>
-              <a:rPr lang="en-US" sz="1500">
-                <a:solidFill>
-                  <a:srgbClr val="FFFFFF"/>
-                </a:solidFill>
-              </a:rPr>
+              <a:rPr lang="en-US" dirty="0"/>
               <a:t>Physics-oriented, using stacked integration to calculate the position, velocity, and acceleration from an input force.</a:t>
             </a:r>
           </a:p>
           <a:p>
             <a:r>
-              <a:rPr lang="en-US" sz="1500">
-                <a:solidFill>
-                  <a:srgbClr val="FFFFFF"/>
-                </a:solidFill>
-              </a:rPr>
-              <a:t>Based on the equations present in “</a:t>
-            </a:r>
-            <a:r>
-              <a:rPr lang="en-US" sz="1500" b="0" i="0" u="none" strike="noStrike" baseline="0">
-                <a:solidFill>
-                  <a:srgbClr val="FFFFFF"/>
-                </a:solidFill>
-              </a:rPr>
-              <a:t>Kinematic and Dynamic Vehicle Models for Autonomous Driving Control Design”</a:t>
-            </a:r>
-          </a:p>
-          <a:p>
-            <a:r>
-              <a:rPr lang="en-US" sz="1500">
-                <a:solidFill>
-                  <a:srgbClr val="FFFFFF"/>
-                </a:solidFill>
-              </a:rPr>
+              <a:rPr lang="en-US" dirty="0"/>
+              <a:t>Based on the equations present in “Kinematic and Dynamic Vehicle Models for Autonomous Driving Control Design”</a:t>
+            </a:r>
+          </a:p>
+          <a:p>
+            <a:r>
+              <a:rPr lang="en-US" dirty="0"/>
               <a:t>Provides physical variables of the autonomous vehicle as a result of the inputs over time.</a:t>
             </a:r>
+          </a:p>
+          <a:p>
+            <a:endParaRPr lang="en-IN" dirty="0"/>
           </a:p>
         </p:txBody>
       </p:sp>
       <p:sp>
         <p:nvSpPr>
-          <p:cNvPr id="4" name="Slide Number Placeholder 3"/>
+          <p:cNvPr id="5" name="Slide Number Placeholder 4"/>
           <p:cNvSpPr>
             <a:spLocks noGrp="1"/>
           </p:cNvSpPr>
@@ -13465,94 +13480,53 @@
             <p:ph type="sldNum" sz="quarter" idx="12"/>
           </p:nvPr>
         </p:nvSpPr>
-        <p:spPr>
-          <a:xfrm>
-            <a:off x="205852" y="6459785"/>
-            <a:ext cx="1312025" cy="365125"/>
-          </a:xfrm>
-        </p:spPr>
+        <p:spPr/>
         <p:txBody>
-          <a:bodyPr>
-            <a:normAutofit/>
-          </a:bodyPr>
+          <a:bodyPr/>
           <a:lstStyle/>
           <a:p>
-            <a:pPr algn="l">
-              <a:spcAft>
-                <a:spcPts val="600"/>
-              </a:spcAft>
-            </a:pPr>
             <a:fld id="{14DE990B-4FB7-4A7F-817E-CABDB30FA765}" type="slidenum">
-              <a:rPr lang="en-IN"/>
-              <a:pPr algn="l">
-                <a:spcAft>
-                  <a:spcPts val="600"/>
-                </a:spcAft>
-              </a:pPr>
+              <a:rPr lang="en-IN" smtClean="0"/>
               <a:t>5</a:t>
             </a:fld>
             <a:endParaRPr lang="en-IN"/>
           </a:p>
         </p:txBody>
       </p:sp>
-      <p:sp>
-        <p:nvSpPr>
-          <p:cNvPr id="35" name="Rectangle 34">
+      <p:pic>
+        <p:nvPicPr>
+          <p:cNvPr id="6" name="Content Placeholder 5">
             <a:extLst>
               <a:ext uri="{FF2B5EF4-FFF2-40B4-BE49-F238E27FC236}">
-                <a16:creationId xmlns:a16="http://schemas.microsoft.com/office/drawing/2014/main" id="{A108754F-0BAB-43E5-8CCC-828C2FC9B2A2}"/>
-              </a:ext>
-              <a:ext uri="{C183D7F6-B498-43B3-948B-1728B52AA6E4}">
-                <adec:decorative xmlns:adec="http://schemas.microsoft.com/office/drawing/2017/decorative" val="1"/>
+                <a16:creationId xmlns:a16="http://schemas.microsoft.com/office/drawing/2014/main" id="{B090C5BC-30C9-4F3C-8355-F2EE4A7D0470}"/>
               </a:ext>
             </a:extLst>
           </p:cNvPr>
-          <p:cNvSpPr>
-            <a:spLocks noGrp="1" noRot="1" noChangeAspect="1" noMove="1" noResize="1" noEditPoints="1" noAdjustHandles="1" noChangeArrowheads="1" noChangeShapeType="1" noTextEdit="1"/>
-          </p:cNvSpPr>
+          <p:cNvPicPr>
+            <a:picLocks noGrp="1" noChangeAspect="1"/>
+          </p:cNvPicPr>
           <p:nvPr>
-            <p:extLst>
-              <p:ext uri="{386F3935-93C4-4BCD-93E2-E3B085C9AB24}">
-                <p16:designElem xmlns:p16="http://schemas.microsoft.com/office/powerpoint/2015/main" val="1"/>
-              </p:ext>
-            </p:extLst>
+            <p:ph idx="1"/>
           </p:nvPr>
-        </p:nvSpPr>
+        </p:nvPicPr>
+        <p:blipFill rotWithShape="1">
+          <a:blip r:embed="rId2"/>
+          <a:srcRect t="6374" r="2" b="1372"/>
+          <a:stretch/>
+        </p:blipFill>
         <p:spPr>
           <a:xfrm>
-            <a:off x="4590679" y="0"/>
-            <a:ext cx="64008" cy="6858000"/>
+            <a:off x="4719608" y="264983"/>
+            <a:ext cx="6492875" cy="2944752"/>
           </a:xfrm>
           <a:prstGeom prst="rect">
             <a:avLst/>
           </a:prstGeom>
-          <a:solidFill>
-            <a:schemeClr val="accent1"/>
-          </a:solidFill>
-          <a:ln>
-            <a:noFill/>
-          </a:ln>
         </p:spPr>
-        <p:style>
-          <a:lnRef idx="2">
-            <a:schemeClr val="accent1">
-              <a:shade val="50000"/>
-            </a:schemeClr>
-          </a:lnRef>
-          <a:fillRef idx="1">
-            <a:schemeClr val="accent1"/>
-          </a:fillRef>
-          <a:effectRef idx="0">
-            <a:schemeClr val="accent1"/>
-          </a:effectRef>
-          <a:fontRef idx="minor">
-            <a:schemeClr val="lt1"/>
-          </a:fontRef>
-        </p:style>
-      </p:sp>
+      </p:pic>
       <p:pic>
         <p:nvPicPr>
-          <p:cNvPr id="8" name="Picture 7">
+          <p:cNvPr id="7" name="Picture 6">
             <a:extLst>
               <a:ext uri="{FF2B5EF4-FFF2-40B4-BE49-F238E27FC236}">
                 <a16:creationId xmlns:a16="http://schemas.microsoft.com/office/drawing/2014/main" id="{EB105DBE-8FCC-40DF-9066-8CD770BD8305}"/>
@@ -13565,106 +13539,14 @@
           <p:nvPr/>
         </p:nvPicPr>
         <p:blipFill rotWithShape="1">
-          <a:blip r:embed="rId2"/>
+          <a:blip r:embed="rId3"/>
           <a:srcRect r="4" b="6414"/>
           <a:stretch/>
         </p:blipFill>
         <p:spPr>
           <a:xfrm>
-            <a:off x="4895437" y="0"/>
-            <a:ext cx="3606643" cy="3358597"/>
-          </a:xfrm>
-          <a:prstGeom prst="rect">
-            <a:avLst/>
-          </a:prstGeom>
-        </p:spPr>
-      </p:pic>
-      <p:sp>
-        <p:nvSpPr>
-          <p:cNvPr id="42" name="Rectangle 36">
-            <a:extLst>
-              <a:ext uri="{FF2B5EF4-FFF2-40B4-BE49-F238E27FC236}">
-                <a16:creationId xmlns:a16="http://schemas.microsoft.com/office/drawing/2014/main" id="{6FBFE7E1-0D9B-4B97-B754-C685448793B7}"/>
-              </a:ext>
-              <a:ext uri="{C183D7F6-B498-43B3-948B-1728B52AA6E4}">
-                <adec:decorative xmlns:adec="http://schemas.microsoft.com/office/drawing/2017/decorative" val="1"/>
-              </a:ext>
-            </a:extLst>
-          </p:cNvPr>
-          <p:cNvSpPr>
-            <a:spLocks noGrp="1" noRot="1" noChangeAspect="1" noMove="1" noResize="1" noEditPoints="1" noAdjustHandles="1" noChangeArrowheads="1" noChangeShapeType="1" noTextEdit="1"/>
-          </p:cNvSpPr>
-          <p:nvPr>
-            <p:extLst>
-              <p:ext uri="{386F3935-93C4-4BCD-93E2-E3B085C9AB24}">
-                <p16:designElem xmlns:p16="http://schemas.microsoft.com/office/powerpoint/2015/main" val="1"/>
-              </p:ext>
-            </p:extLst>
-          </p:nvPr>
-        </p:nvSpPr>
-        <p:spPr>
-          <a:xfrm>
-            <a:off x="8576279" y="0"/>
-            <a:ext cx="3610035" cy="3355942"/>
-          </a:xfrm>
-          <a:prstGeom prst="rect">
-            <a:avLst/>
-          </a:prstGeom>
-          <a:solidFill>
-            <a:schemeClr val="accent1"/>
-          </a:solidFill>
-          <a:ln>
-            <a:noFill/>
-          </a:ln>
-        </p:spPr>
-        <p:style>
-          <a:lnRef idx="2">
-            <a:schemeClr val="accent1">
-              <a:shade val="50000"/>
-            </a:schemeClr>
-          </a:lnRef>
-          <a:fillRef idx="1">
-            <a:schemeClr val="accent1"/>
-          </a:fillRef>
-          <a:effectRef idx="0">
-            <a:schemeClr val="accent1"/>
-          </a:effectRef>
-          <a:fontRef idx="minor">
-            <a:schemeClr val="lt1"/>
-          </a:fontRef>
-        </p:style>
-        <p:txBody>
-          <a:bodyPr rtlCol="0" anchor="ctr"/>
-          <a:lstStyle/>
-          <a:p>
-            <a:pPr algn="ctr"/>
-            <a:endParaRPr lang="en-US"/>
-          </a:p>
-        </p:txBody>
-      </p:sp>
-      <p:pic>
-        <p:nvPicPr>
-          <p:cNvPr id="6" name="Content Placeholder 5">
-            <a:extLst>
-              <a:ext uri="{FF2B5EF4-FFF2-40B4-BE49-F238E27FC236}">
-                <a16:creationId xmlns:a16="http://schemas.microsoft.com/office/drawing/2014/main" id="{B090C5BC-30C9-4F3C-8355-F2EE4A7D0470}"/>
-              </a:ext>
-            </a:extLst>
-          </p:cNvPr>
-          <p:cNvPicPr>
-            <a:picLocks noChangeAspect="1"/>
-          </p:cNvPicPr>
-          <p:nvPr/>
-        </p:nvPicPr>
-        <p:blipFill rotWithShape="1">
-          <a:blip r:embed="rId3"/>
-          <a:srcRect t="6374" r="2" b="1372"/>
-          <a:stretch/>
-        </p:blipFill>
-        <p:spPr>
-          <a:xfrm>
-            <a:off x="4812160" y="3504904"/>
-            <a:ext cx="7379840" cy="3353096"/>
+            <a:off x="6134957" y="3283750"/>
+            <a:ext cx="4238403" cy="3358597"/>
           </a:xfrm>
           <a:prstGeom prst="rect">
             <a:avLst/>
@@ -13674,13 +13556,20 @@
     </p:spTree>
     <p:extLst>
       <p:ext uri="{BB962C8B-B14F-4D97-AF65-F5344CB8AC3E}">
-        <p14:creationId xmlns:p14="http://schemas.microsoft.com/office/powerpoint/2010/main" val="3611492434"/>
+        <p14:creationId xmlns:p14="http://schemas.microsoft.com/office/powerpoint/2010/main" val="475589002"/>
       </p:ext>
     </p:extLst>
   </p:cSld>
   <p:clrMapOvr>
     <a:masterClrMapping/>
   </p:clrMapOvr>
+  <p:timing>
+    <p:tnLst>
+      <p:par>
+        <p:cTn id="1" dur="indefinite" restart="never" nodeType="tmRoot"/>
+      </p:par>
+    </p:tnLst>
+  </p:timing>
 </p:sld>
 </file>
 
@@ -13717,7 +13606,7 @@
                 <a16:creationId xmlns:a16="http://schemas.microsoft.com/office/drawing/2014/main" id="{E48D01E3-AED1-46C9-B523-17A9461C00EB}"/>
               </a:ext>
               <a:ext uri="{C183D7F6-B498-43B3-948B-1728B52AA6E4}">
-                <adec:decorative xmlns:adec="http://schemas.microsoft.com/office/drawing/2017/decorative" val="1"/>
+                <adec:decorative xmlns:adec="http://schemas.microsoft.com/office/drawing/2017/decorative" xmlns="" val="1"/>
               </a:ext>
             </a:extLst>
           </p:cNvPr>
@@ -13777,7 +13666,7 @@
                 <a16:creationId xmlns:a16="http://schemas.microsoft.com/office/drawing/2014/main" id="{7695FC05-2594-4673-AAC8-0FD2D0413A4F}"/>
               </a:ext>
               <a:ext uri="{C183D7F6-B498-43B3-948B-1728B52AA6E4}">
-                <adec:decorative xmlns:adec="http://schemas.microsoft.com/office/drawing/2017/decorative" val="1"/>
+                <adec:decorative xmlns:adec="http://schemas.microsoft.com/office/drawing/2017/decorative" xmlns="" val="1"/>
               </a:ext>
             </a:extLst>
           </p:cNvPr>
@@ -13896,7 +13785,7 @@
                 <a16:creationId xmlns:a16="http://schemas.microsoft.com/office/drawing/2014/main" id="{DF327FF0-C38E-4831-A8A2-BD705672D281}"/>
               </a:ext>
               <a:ext uri="{C183D7F6-B498-43B3-948B-1728B52AA6E4}">
-                <adec:decorative xmlns:adec="http://schemas.microsoft.com/office/drawing/2017/decorative" val="1"/>
+                <adec:decorative xmlns:adec="http://schemas.microsoft.com/office/drawing/2017/decorative" xmlns="" val="1"/>
               </a:ext>
             </a:extLst>
           </p:cNvPr>
@@ -13975,7 +13864,7 @@
                 <a16:creationId xmlns:a16="http://schemas.microsoft.com/office/drawing/2014/main" id="{13AC83F2-62BC-408B-8009-1BF496146533}"/>
               </a:ext>
               <a:ext uri="{C183D7F6-B498-43B3-948B-1728B52AA6E4}">
-                <adec:decorative xmlns:adec="http://schemas.microsoft.com/office/drawing/2017/decorative" val="1"/>
+                <adec:decorative xmlns:adec="http://schemas.microsoft.com/office/drawing/2017/decorative" xmlns="" val="1"/>
               </a:ext>
             </a:extLst>
           </p:cNvPr>
@@ -14102,6 +13991,30 @@
           </a:p>
         </p:txBody>
       </p:sp>
+      <p:pic>
+        <p:nvPicPr>
+          <p:cNvPr id="11" name="Content Placeholder 3"/>
+          <p:cNvPicPr>
+            <a:picLocks noChangeAspect="1"/>
+          </p:cNvPicPr>
+          <p:nvPr/>
+        </p:nvPicPr>
+        <p:blipFill>
+          <a:blip r:embed="rId7"/>
+          <a:stretch>
+            <a:fillRect/>
+          </a:stretch>
+        </p:blipFill>
+        <p:spPr>
+          <a:xfrm>
+            <a:off x="8236979" y="1115745"/>
+            <a:ext cx="3609294" cy="1633205"/>
+          </a:xfrm>
+          <a:prstGeom prst="rect">
+            <a:avLst/>
+          </a:prstGeom>
+        </p:spPr>
+      </p:pic>
     </p:spTree>
     <p:extLst>
       <p:ext uri="{BB962C8B-B14F-4D97-AF65-F5344CB8AC3E}">
@@ -14112,6 +14025,13 @@
   <p:clrMapOvr>
     <a:masterClrMapping/>
   </p:clrMapOvr>
+  <p:timing>
+    <p:tnLst>
+      <p:par>
+        <p:cTn id="1" dur="indefinite" restart="never" nodeType="tmRoot"/>
+      </p:par>
+    </p:tnLst>
+  </p:timing>
 </p:sld>
 </file>
 
@@ -14148,7 +14068,7 @@
                 <a16:creationId xmlns:a16="http://schemas.microsoft.com/office/drawing/2014/main" id="{605A42EF-68E6-4808-81CD-E5ABD0ED92CA}"/>
               </a:ext>
               <a:ext uri="{C183D7F6-B498-43B3-948B-1728B52AA6E4}">
-                <adec:decorative xmlns:adec="http://schemas.microsoft.com/office/drawing/2017/decorative" val="1"/>
+                <adec:decorative xmlns:adec="http://schemas.microsoft.com/office/drawing/2017/decorative" xmlns="" val="1"/>
               </a:ext>
             </a:extLst>
           </p:cNvPr>
@@ -14223,10 +14143,10 @@
           <a:lstStyle/>
           <a:p>
             <a:r>
-              <a:rPr lang="en-US" sz="4400" b="1"/>
+              <a:rPr lang="en-US" sz="4400" b="1" dirty="0"/>
               <a:t>Top Level- Verification Dashboard</a:t>
             </a:r>
-            <a:endParaRPr lang="en-IN" sz="4400" b="1"/>
+            <a:endParaRPr lang="en-IN" sz="4400" b="1" dirty="0"/>
           </a:p>
         </p:txBody>
       </p:sp>
@@ -14268,7 +14188,7 @@
                 <a16:creationId xmlns:a16="http://schemas.microsoft.com/office/drawing/2014/main" id="{3C4A154E-1950-4755-A5FC-5998EE0CC14B}"/>
               </a:ext>
               <a:ext uri="{C183D7F6-B498-43B3-948B-1728B52AA6E4}">
-                <adec:decorative xmlns:adec="http://schemas.microsoft.com/office/drawing/2017/decorative" val="1"/>
+                <adec:decorative xmlns:adec="http://schemas.microsoft.com/office/drawing/2017/decorative" xmlns="" val="1"/>
               </a:ext>
             </a:extLst>
           </p:cNvPr>
@@ -14371,7 +14291,7 @@
                 <a16:creationId xmlns:a16="http://schemas.microsoft.com/office/drawing/2014/main" id="{3FE9C285-56FB-4B36-8ECA-C2D6596AA906}"/>
               </a:ext>
               <a:ext uri="{C183D7F6-B498-43B3-948B-1728B52AA6E4}">
-                <adec:decorative xmlns:adec="http://schemas.microsoft.com/office/drawing/2017/decorative" val="1"/>
+                <adec:decorative xmlns:adec="http://schemas.microsoft.com/office/drawing/2017/decorative" xmlns="" val="1"/>
               </a:ext>
             </a:extLst>
           </p:cNvPr>
@@ -14426,7 +14346,7 @@
                 <a16:creationId xmlns:a16="http://schemas.microsoft.com/office/drawing/2014/main" id="{937C076B-00B1-4629-B27F-A86F9885FB4D}"/>
               </a:ext>
               <a:ext uri="{C183D7F6-B498-43B3-948B-1728B52AA6E4}">
-                <adec:decorative xmlns:adec="http://schemas.microsoft.com/office/drawing/2017/decorative" val="1"/>
+                <adec:decorative xmlns:adec="http://schemas.microsoft.com/office/drawing/2017/decorative" xmlns="" val="1"/>
               </a:ext>
             </a:extLst>
           </p:cNvPr>
@@ -14523,20 +14443,19 @@
   <p:clrMapOvr>
     <a:masterClrMapping/>
   </p:clrMapOvr>
+  <p:timing>
+    <p:tnLst>
+      <p:par>
+        <p:cTn id="1" dur="indefinite" restart="never" nodeType="tmRoot"/>
+      </p:par>
+    </p:tnLst>
+  </p:timing>
 </p:sld>
 </file>
 
 <file path=ppt/slides/slide8.xml><?xml version="1.0" encoding="utf-8"?>
 <p:sld xmlns:a="http://schemas.openxmlformats.org/drawingml/2006/main" xmlns:r="http://schemas.openxmlformats.org/officeDocument/2006/relationships" xmlns:p="http://schemas.openxmlformats.org/presentationml/2006/main">
   <p:cSld>
-    <p:bg>
-      <p:bgPr>
-        <a:solidFill>
-          <a:schemeClr val="bg1"/>
-        </a:solidFill>
-        <a:effectLst/>
-      </p:bgPr>
-    </p:bg>
     <p:spTree>
       <p:nvGrpSpPr>
         <p:cNvPr id="1" name=""/>
@@ -14551,66 +14470,6 @@
           <a:chExt cx="0" cy="0"/>
         </a:xfrm>
       </p:grpSpPr>
-      <p:sp useBgFill="1">
-        <p:nvSpPr>
-          <p:cNvPr id="11" name="Rectangle 10">
-            <a:extLst>
-              <a:ext uri="{FF2B5EF4-FFF2-40B4-BE49-F238E27FC236}">
-                <a16:creationId xmlns:a16="http://schemas.microsoft.com/office/drawing/2014/main" id="{605A42EF-68E6-4808-81CD-E5ABD0ED92CA}"/>
-              </a:ext>
-              <a:ext uri="{C183D7F6-B498-43B3-948B-1728B52AA6E4}">
-                <adec:decorative xmlns:adec="http://schemas.microsoft.com/office/drawing/2017/decorative" val="1"/>
-              </a:ext>
-            </a:extLst>
-          </p:cNvPr>
-          <p:cNvSpPr>
-            <a:spLocks noGrp="1" noRot="1" noChangeAspect="1" noMove="1" noResize="1" noEditPoints="1" noAdjustHandles="1" noChangeArrowheads="1" noChangeShapeType="1" noTextEdit="1"/>
-          </p:cNvSpPr>
-          <p:nvPr>
-            <p:extLst>
-              <p:ext uri="{386F3935-93C4-4BCD-93E2-E3B085C9AB24}">
-                <p16:designElem xmlns:p16="http://schemas.microsoft.com/office/powerpoint/2015/main" val="1"/>
-              </p:ext>
-            </p:extLst>
-          </p:nvPr>
-        </p:nvSpPr>
-        <p:spPr>
-          <a:xfrm>
-            <a:off x="0" y="0"/>
-            <a:ext cx="12192001" cy="6334316"/>
-          </a:xfrm>
-          <a:prstGeom prst="rect">
-            <a:avLst/>
-          </a:prstGeom>
-          <a:ln>
-            <a:noFill/>
-          </a:ln>
-        </p:spPr>
-        <p:style>
-          <a:lnRef idx="2">
-            <a:schemeClr val="accent1">
-              <a:shade val="50000"/>
-            </a:schemeClr>
-          </a:lnRef>
-          <a:fillRef idx="1">
-            <a:schemeClr val="accent1"/>
-          </a:fillRef>
-          <a:effectRef idx="0">
-            <a:schemeClr val="accent1"/>
-          </a:effectRef>
-          <a:fontRef idx="minor">
-            <a:schemeClr val="lt1"/>
-          </a:fontRef>
-        </p:style>
-        <p:txBody>
-          <a:bodyPr rtlCol="0" anchor="ctr"/>
-          <a:lstStyle/>
-          <a:p>
-            <a:pPr algn="ctr"/>
-            <a:endParaRPr lang="en-US"/>
-          </a:p>
-        </p:txBody>
-      </p:sp>
       <p:sp>
         <p:nvSpPr>
           <p:cNvPr id="2" name="Title 1"/>
@@ -14623,8 +14482,8 @@
         </p:nvSpPr>
         <p:spPr>
           <a:xfrm>
-            <a:off x="6411685" y="634946"/>
-            <a:ext cx="5127171" cy="1450757"/>
+            <a:off x="457200" y="594359"/>
+            <a:ext cx="3200400" cy="1854201"/>
           </a:xfrm>
         </p:spPr>
         <p:txBody>
@@ -14634,16 +14493,84 @@
           <a:lstStyle/>
           <a:p>
             <a:r>
-              <a:rPr lang="en-US" b="1"/>
+              <a:rPr lang="en-US" sz="3200" b="1" dirty="0"/>
               <a:t>Drive Straight Ahead at 60 MPH</a:t>
             </a:r>
-            <a:endParaRPr lang="en-IN" b="1" dirty="0"/>
+            <a:endParaRPr lang="en-IN" sz="3200" dirty="0"/>
+          </a:p>
+        </p:txBody>
+      </p:sp>
+      <p:sp>
+        <p:nvSpPr>
+          <p:cNvPr id="5" name="Slide Number Placeholder 4"/>
+          <p:cNvSpPr>
+            <a:spLocks noGrp="1"/>
+          </p:cNvSpPr>
+          <p:nvPr>
+            <p:ph type="sldNum" sz="quarter" idx="12"/>
+          </p:nvPr>
+        </p:nvSpPr>
+        <p:spPr/>
+        <p:txBody>
+          <a:bodyPr/>
+          <a:lstStyle/>
+          <a:p>
+            <a:fld id="{14DE990B-4FB7-4A7F-817E-CABDB30FA765}" type="slidenum">
+              <a:rPr lang="en-IN" smtClean="0"/>
+              <a:t>8</a:t>
+            </a:fld>
+            <a:endParaRPr lang="en-IN"/>
+          </a:p>
+        </p:txBody>
+      </p:sp>
+      <p:sp>
+        <p:nvSpPr>
+          <p:cNvPr id="6" name="Content Placeholder 2"/>
+          <p:cNvSpPr>
+            <a:spLocks noGrp="1"/>
+          </p:cNvSpPr>
+          <p:nvPr>
+            <p:ph type="body" sz="half" idx="2"/>
+          </p:nvPr>
+        </p:nvSpPr>
+        <p:spPr/>
+        <p:txBody>
+          <a:bodyPr>
+            <a:normAutofit/>
+          </a:bodyPr>
+          <a:lstStyle/>
+          <a:p>
+            <a:r>
+              <a:rPr lang="en-IN" sz="2000" dirty="0"/>
+              <a:t>Models entering highway from on-ramp.</a:t>
+            </a:r>
+          </a:p>
+          <a:p>
+            <a:r>
+              <a:rPr lang="en-IN" sz="2000" dirty="0"/>
+              <a:t>Ensures vehicle accelerates at an acceptable rate.</a:t>
+            </a:r>
+          </a:p>
+          <a:p>
+            <a:r>
+              <a:rPr lang="en-IN" sz="2000" dirty="0"/>
+              <a:t>Ensures the vehicle can maintain a speed.</a:t>
+            </a:r>
+          </a:p>
+          <a:p>
+            <a:r>
+              <a:rPr lang="en-IN" sz="2000" dirty="0"/>
+              <a:t>Ensures vehicle can drive straight.</a:t>
+            </a:r>
+          </a:p>
+          <a:p>
+            <a:endParaRPr lang="en-IN" dirty="0"/>
           </a:p>
         </p:txBody>
       </p:sp>
       <p:pic>
         <p:nvPicPr>
-          <p:cNvPr id="6" name="Picture 5">
+          <p:cNvPr id="7" name="Content Placeholder 6">
             <a:extLst>
               <a:ext uri="{FF2B5EF4-FFF2-40B4-BE49-F238E27FC236}">
                 <a16:creationId xmlns:a16="http://schemas.microsoft.com/office/drawing/2014/main" id="{EEBDA16B-1DED-4708-97A7-9E2E814AE7E8}"/>
@@ -14651,9 +14578,11 @@
             </a:extLst>
           </p:cNvPr>
           <p:cNvPicPr>
-            <a:picLocks noChangeAspect="1"/>
+            <a:picLocks noGrp="1" noChangeAspect="1"/>
           </p:cNvPicPr>
-          <p:nvPr/>
+          <p:nvPr>
+            <p:ph idx="1"/>
+          </p:nvPr>
         </p:nvPicPr>
         <p:blipFill>
           <a:blip r:embed="rId2"/>
@@ -14663,280 +14592,31 @@
         </p:blipFill>
         <p:spPr>
           <a:xfrm>
-            <a:off x="212115" y="1541326"/>
-            <a:ext cx="5987453" cy="3203287"/>
+            <a:off x="4445000" y="1534026"/>
+            <a:ext cx="7147208" cy="3820293"/>
           </a:xfrm>
           <a:prstGeom prst="rect">
             <a:avLst/>
           </a:prstGeom>
         </p:spPr>
       </p:pic>
-      <p:cxnSp>
-        <p:nvCxnSpPr>
-          <p:cNvPr id="13" name="Straight Connector 12">
-            <a:extLst>
-              <a:ext uri="{FF2B5EF4-FFF2-40B4-BE49-F238E27FC236}">
-                <a16:creationId xmlns:a16="http://schemas.microsoft.com/office/drawing/2014/main" id="{3C4A154E-1950-4755-A5FC-5998EE0CC14B}"/>
-              </a:ext>
-              <a:ext uri="{C183D7F6-B498-43B3-948B-1728B52AA6E4}">
-                <adec:decorative xmlns:adec="http://schemas.microsoft.com/office/drawing/2017/decorative" val="1"/>
-              </a:ext>
-            </a:extLst>
-          </p:cNvPr>
-          <p:cNvCxnSpPr>
-            <a:cxnSpLocks noGrp="1" noRot="1" noChangeAspect="1" noMove="1" noResize="1" noEditPoints="1" noAdjustHandles="1" noChangeArrowheads="1" noChangeShapeType="1"/>
-          </p:cNvCxnSpPr>
-          <p:nvPr>
-            <p:extLst>
-              <p:ext uri="{386F3935-93C4-4BCD-93E2-E3B085C9AB24}">
-                <p16:designElem xmlns:p16="http://schemas.microsoft.com/office/powerpoint/2015/main" val="1"/>
-              </p:ext>
-            </p:extLst>
-          </p:nvPr>
-        </p:nvCxnSpPr>
-        <p:spPr>
-          <a:xfrm>
-            <a:off x="6411684" y="2086188"/>
-            <a:ext cx="4748808" cy="0"/>
-          </a:xfrm>
-          <a:prstGeom prst="line">
-            <a:avLst/>
-          </a:prstGeom>
-          <a:ln w="6350">
-            <a:solidFill>
-              <a:schemeClr val="tx1">
-                <a:lumMod val="50000"/>
-                <a:lumOff val="50000"/>
-                <a:alpha val="90000"/>
-              </a:schemeClr>
-            </a:solidFill>
-          </a:ln>
-        </p:spPr>
-        <p:style>
-          <a:lnRef idx="1">
-            <a:schemeClr val="accent1"/>
-          </a:lnRef>
-          <a:fillRef idx="0">
-            <a:schemeClr val="accent1"/>
-          </a:fillRef>
-          <a:effectRef idx="0">
-            <a:schemeClr val="accent1"/>
-          </a:effectRef>
-          <a:fontRef idx="minor">
-            <a:schemeClr val="tx1"/>
-          </a:fontRef>
-        </p:style>
-      </p:cxnSp>
-      <p:sp>
-        <p:nvSpPr>
-          <p:cNvPr id="3" name="Content Placeholder 2"/>
-          <p:cNvSpPr>
-            <a:spLocks noGrp="1"/>
-          </p:cNvSpPr>
-          <p:nvPr>
-            <p:ph idx="1"/>
-          </p:nvPr>
-        </p:nvSpPr>
-        <p:spPr>
-          <a:xfrm>
-            <a:off x="6411684" y="2198914"/>
-            <a:ext cx="5127172" cy="3670180"/>
-          </a:xfrm>
-        </p:spPr>
-        <p:txBody>
-          <a:bodyPr>
-            <a:normAutofit/>
-          </a:bodyPr>
-          <a:lstStyle/>
-          <a:p>
-            <a:r>
-              <a:rPr lang="en-IN" dirty="0"/>
-              <a:t>Models entering highway from on-ramp.</a:t>
-            </a:r>
-          </a:p>
-          <a:p>
-            <a:r>
-              <a:rPr lang="en-IN" dirty="0"/>
-              <a:t>Ensures vehicle accelerates at an acceptable rate.</a:t>
-            </a:r>
-          </a:p>
-          <a:p>
-            <a:r>
-              <a:rPr lang="en-IN" dirty="0"/>
-              <a:t>Ensures the vehicle can maintain a speed.</a:t>
-            </a:r>
-          </a:p>
-          <a:p>
-            <a:r>
-              <a:rPr lang="en-IN" dirty="0"/>
-              <a:t>Ensures vehicle can drive straight.</a:t>
-            </a:r>
-          </a:p>
-          <a:p>
-            <a:endParaRPr lang="en-IN" dirty="0"/>
-          </a:p>
-        </p:txBody>
-      </p:sp>
-      <p:sp>
-        <p:nvSpPr>
-          <p:cNvPr id="15" name="Rectangle 14">
-            <a:extLst>
-              <a:ext uri="{FF2B5EF4-FFF2-40B4-BE49-F238E27FC236}">
-                <a16:creationId xmlns:a16="http://schemas.microsoft.com/office/drawing/2014/main" id="{3FE9C285-56FB-4B36-8ECA-C2D6596AA906}"/>
-              </a:ext>
-              <a:ext uri="{C183D7F6-B498-43B3-948B-1728B52AA6E4}">
-                <adec:decorative xmlns:adec="http://schemas.microsoft.com/office/drawing/2017/decorative" val="1"/>
-              </a:ext>
-            </a:extLst>
-          </p:cNvPr>
-          <p:cNvSpPr>
-            <a:spLocks noGrp="1" noRot="1" noChangeAspect="1" noMove="1" noResize="1" noEditPoints="1" noAdjustHandles="1" noChangeArrowheads="1" noChangeShapeType="1" noTextEdit="1"/>
-          </p:cNvSpPr>
-          <p:nvPr>
-            <p:extLst>
-              <p:ext uri="{386F3935-93C4-4BCD-93E2-E3B085C9AB24}">
-                <p16:designElem xmlns:p16="http://schemas.microsoft.com/office/powerpoint/2015/main" val="1"/>
-              </p:ext>
-            </p:extLst>
-          </p:nvPr>
-        </p:nvSpPr>
-        <p:spPr>
-          <a:xfrm>
-            <a:off x="15" y="6334316"/>
-            <a:ext cx="12191985" cy="66484"/>
-          </a:xfrm>
-          <a:prstGeom prst="rect">
-            <a:avLst/>
-          </a:prstGeom>
-          <a:solidFill>
-            <a:schemeClr val="accent1"/>
-          </a:solidFill>
-          <a:ln>
-            <a:noFill/>
-          </a:ln>
-        </p:spPr>
-        <p:style>
-          <a:lnRef idx="2">
-            <a:schemeClr val="accent1">
-              <a:shade val="50000"/>
-            </a:schemeClr>
-          </a:lnRef>
-          <a:fillRef idx="1">
-            <a:schemeClr val="accent1"/>
-          </a:fillRef>
-          <a:effectRef idx="0">
-            <a:schemeClr val="accent1"/>
-          </a:effectRef>
-          <a:fontRef idx="minor">
-            <a:schemeClr val="lt1"/>
-          </a:fontRef>
-        </p:style>
-      </p:sp>
-      <p:sp>
-        <p:nvSpPr>
-          <p:cNvPr id="17" name="Rectangle 16">
-            <a:extLst>
-              <a:ext uri="{FF2B5EF4-FFF2-40B4-BE49-F238E27FC236}">
-                <a16:creationId xmlns:a16="http://schemas.microsoft.com/office/drawing/2014/main" id="{937C076B-00B1-4629-B27F-A86F9885FB4D}"/>
-              </a:ext>
-              <a:ext uri="{C183D7F6-B498-43B3-948B-1728B52AA6E4}">
-                <adec:decorative xmlns:adec="http://schemas.microsoft.com/office/drawing/2017/decorative" val="1"/>
-              </a:ext>
-            </a:extLst>
-          </p:cNvPr>
-          <p:cNvSpPr>
-            <a:spLocks noGrp="1" noRot="1" noChangeAspect="1" noMove="1" noResize="1" noEditPoints="1" noAdjustHandles="1" noChangeArrowheads="1" noChangeShapeType="1" noTextEdit="1"/>
-          </p:cNvSpPr>
-          <p:nvPr>
-            <p:extLst>
-              <p:ext uri="{386F3935-93C4-4BCD-93E2-E3B085C9AB24}">
-                <p16:designElem xmlns:p16="http://schemas.microsoft.com/office/powerpoint/2015/main" val="1"/>
-              </p:ext>
-            </p:extLst>
-          </p:nvPr>
-        </p:nvSpPr>
-        <p:spPr>
-          <a:xfrm>
-            <a:off x="1" y="6400800"/>
-            <a:ext cx="12192000" cy="457200"/>
-          </a:xfrm>
-          <a:prstGeom prst="rect">
-            <a:avLst/>
-          </a:prstGeom>
-          <a:solidFill>
-            <a:schemeClr val="accent2"/>
-          </a:solidFill>
-          <a:ln>
-            <a:noFill/>
-          </a:ln>
-        </p:spPr>
-        <p:style>
-          <a:lnRef idx="2">
-            <a:schemeClr val="accent1">
-              <a:shade val="50000"/>
-            </a:schemeClr>
-          </a:lnRef>
-          <a:fillRef idx="1">
-            <a:schemeClr val="accent1"/>
-          </a:fillRef>
-          <a:effectRef idx="0">
-            <a:schemeClr val="accent1"/>
-          </a:effectRef>
-          <a:fontRef idx="minor">
-            <a:schemeClr val="lt1"/>
-          </a:fontRef>
-        </p:style>
-      </p:sp>
-      <p:sp>
-        <p:nvSpPr>
-          <p:cNvPr id="4" name="Slide Number Placeholder 3"/>
-          <p:cNvSpPr>
-            <a:spLocks noGrp="1"/>
-          </p:cNvSpPr>
-          <p:nvPr>
-            <p:ph type="sldNum" sz="quarter" idx="12"/>
-          </p:nvPr>
-        </p:nvSpPr>
-        <p:spPr>
-          <a:xfrm>
-            <a:off x="9900458" y="6459785"/>
-            <a:ext cx="1312025" cy="365125"/>
-          </a:xfrm>
-        </p:spPr>
-        <p:txBody>
-          <a:bodyPr>
-            <a:normAutofit/>
-          </a:bodyPr>
-          <a:lstStyle/>
-          <a:p>
-            <a:pPr>
-              <a:spcAft>
-                <a:spcPts val="600"/>
-              </a:spcAft>
-            </a:pPr>
-            <a:fld id="{14DE990B-4FB7-4A7F-817E-CABDB30FA765}" type="slidenum">
-              <a:rPr lang="en-IN" smtClean="0"/>
-              <a:pPr>
-                <a:spcAft>
-                  <a:spcPts val="600"/>
-                </a:spcAft>
-              </a:pPr>
-              <a:t>8</a:t>
-            </a:fld>
-            <a:endParaRPr lang="en-IN"/>
-          </a:p>
-        </p:txBody>
-      </p:sp>
     </p:spTree>
     <p:extLst>
       <p:ext uri="{BB962C8B-B14F-4D97-AF65-F5344CB8AC3E}">
-        <p14:creationId xmlns:p14="http://schemas.microsoft.com/office/powerpoint/2010/main" val="1781863224"/>
+        <p14:creationId xmlns:p14="http://schemas.microsoft.com/office/powerpoint/2010/main" val="3397245783"/>
       </p:ext>
     </p:extLst>
   </p:cSld>
   <p:clrMapOvr>
     <a:masterClrMapping/>
   </p:clrMapOvr>
+  <p:timing>
+    <p:tnLst>
+      <p:par>
+        <p:cTn id="1" dur="indefinite" restart="never" nodeType="tmRoot"/>
+      </p:par>
+    </p:tnLst>
+  </p:timing>
 </p:sld>
 </file>
 
@@ -14973,7 +14653,7 @@
                 <a16:creationId xmlns:a16="http://schemas.microsoft.com/office/drawing/2014/main" id="{038B8727-D318-4B70-B353-C390602FF311}"/>
               </a:ext>
               <a:ext uri="{C183D7F6-B498-43B3-948B-1728B52AA6E4}">
-                <adec:decorative xmlns:adec="http://schemas.microsoft.com/office/drawing/2017/decorative" val="1"/>
+                <adec:decorative xmlns:adec="http://schemas.microsoft.com/office/drawing/2017/decorative" xmlns="" val="1"/>
               </a:ext>
             </a:extLst>
           </p:cNvPr>
@@ -15033,7 +14713,7 @@
                 <a16:creationId xmlns:a16="http://schemas.microsoft.com/office/drawing/2014/main" id="{1B0C8367-28B6-4EF1-B182-01BEC98727DB}"/>
               </a:ext>
               <a:ext uri="{C183D7F6-B498-43B3-948B-1728B52AA6E4}">
-                <adec:decorative xmlns:adec="http://schemas.microsoft.com/office/drawing/2017/decorative" val="1"/>
+                <adec:decorative xmlns:adec="http://schemas.microsoft.com/office/drawing/2017/decorative" xmlns="" val="1"/>
               </a:ext>
             </a:extLst>
           </p:cNvPr>
@@ -15093,7 +14773,7 @@
         <p:spPr>
           <a:xfrm>
             <a:off x="492370" y="516835"/>
-            <a:ext cx="3084844" cy="2103875"/>
+            <a:ext cx="3084844" cy="1860605"/>
           </a:xfrm>
         </p:spPr>
         <p:txBody>
@@ -15103,14 +14783,14 @@
           <a:lstStyle/>
           <a:p>
             <a:r>
-              <a:rPr lang="en-US" sz="3600" b="1">
+              <a:rPr lang="en-US" sz="3600" b="1" dirty="0">
                 <a:solidFill>
                   <a:srgbClr val="FFFFFF"/>
                 </a:solidFill>
               </a:rPr>
               <a:t>Speed up and Speed Down Test </a:t>
             </a:r>
-            <a:endParaRPr lang="en-IN" sz="3600" b="1">
+            <a:endParaRPr lang="en-IN" sz="3600" b="1" dirty="0">
               <a:solidFill>
                 <a:srgbClr val="FFFFFF"/>
               </a:solidFill>
@@ -15147,7 +14827,7 @@
           <a:lstStyle/>
           <a:p>
             <a:r>
-              <a:rPr lang="en-US" sz="1500" dirty="0">
+              <a:rPr lang="en-US" dirty="0">
                 <a:solidFill>
                   <a:srgbClr val="FFFFFF"/>
                 </a:solidFill>
@@ -15157,7 +14837,7 @@
           </a:p>
           <a:p>
             <a:r>
-              <a:rPr lang="en-US" sz="1500" dirty="0">
+              <a:rPr lang="en-US" dirty="0">
                 <a:solidFill>
                   <a:srgbClr val="FFFFFF"/>
                 </a:solidFill>
@@ -15167,7 +14847,7 @@
           </a:p>
           <a:p>
             <a:r>
-              <a:rPr lang="en-US" sz="1500" dirty="0">
+              <a:rPr lang="en-US" dirty="0">
                 <a:solidFill>
                   <a:srgbClr val="FFFFFF"/>
                 </a:solidFill>
@@ -15185,7 +14865,7 @@
                 <a16:creationId xmlns:a16="http://schemas.microsoft.com/office/drawing/2014/main" id="{649E3F4C-17F5-49E4-B05F-80C6B348AF28}"/>
               </a:ext>
               <a:ext uri="{C183D7F6-B498-43B3-948B-1728B52AA6E4}">
-                <adec:decorative xmlns:adec="http://schemas.microsoft.com/office/drawing/2017/decorative" val="1"/>
+                <adec:decorative xmlns:adec="http://schemas.microsoft.com/office/drawing/2017/decorative" xmlns="" val="1"/>
               </a:ext>
             </a:extLst>
           </p:cNvPr>
@@ -15320,6 +15000,13 @@
   <p:clrMapOvr>
     <a:masterClrMapping/>
   </p:clrMapOvr>
+  <p:timing>
+    <p:tnLst>
+      <p:par>
+        <p:cTn id="1" dur="indefinite" restart="never" nodeType="tmRoot"/>
+      </p:par>
+    </p:tnLst>
+  </p:timing>
 </p:sld>
 </file>
 

</xml_diff>